<commit_message>
Update slide links and images
</commit_message>
<xml_diff>
--- a/arquitetura-RIBs.pptx
+++ b/arquitetura-RIBs.pptx
@@ -1,47 +1,120 @@
 
 <file path=ppt/presentation.xml><?xml version="1.0" encoding="utf-8"?>
-<p:presentation xmlns:a="http://schemas.openxmlformats.org/drawingml/2006/main" xmlns:r="http://schemas.openxmlformats.org/officeDocument/2006/relationships" xmlns:p="http://schemas.openxmlformats.org/presentationml/2006/main" embedTrueTypeFonts="1" saveSubsetFonts="1">
+<p:presentation xmlns:a="http://schemas.openxmlformats.org/drawingml/2006/main" xmlns:r="http://schemas.openxmlformats.org/officeDocument/2006/relationships" xmlns:p="http://schemas.openxmlformats.org/presentationml/2006/main" saveSubsetFonts="1" embedTrueTypeFonts="true">
   <p:sldMasterIdLst>
     <p:sldMasterId id="2147483648" r:id="rId1"/>
   </p:sldMasterIdLst>
   <p:sldIdLst>
-    <p:sldId id="256" r:id="rId2"/>
-    <p:sldId id="257" r:id="rId3"/>
-    <p:sldId id="258" r:id="rId4"/>
-    <p:sldId id="259" r:id="rId5"/>
-    <p:sldId id="260" r:id="rId6"/>
-    <p:sldId id="261" r:id="rId7"/>
-    <p:sldId id="262" r:id="rId8"/>
+    <p:sldId id="256" r:id="rId31"/>
+    <p:sldId id="257" r:id="rId32"/>
+    <p:sldId id="258" r:id="rId33"/>
+    <p:sldId id="259" r:id="rId34"/>
+    <p:sldId id="260" r:id="rId35"/>
+    <p:sldId id="261" r:id="rId36"/>
+    <p:sldId id="262" r:id="rId37"/>
   </p:sldIdLst>
   <p:sldSz cx="18288000" cy="10287000"/>
   <p:notesSz cx="6858000" cy="9144000"/>
   <p:embeddedFontLst>
     <p:embeddedFont>
-      <p:font typeface="Antonio Bold" panose="020B0604020202020204" charset="0"/>
+      <p:font typeface="Trocchi" charset="1" panose="00000500000000000000"/>
+      <p:regular r:id="rId6"/>
+    </p:embeddedFont>
+    <p:embeddedFont>
+      <p:font typeface="Arimo" charset="1" panose="020B0604020202020204"/>
+      <p:regular r:id="rId7"/>
+    </p:embeddedFont>
+    <p:embeddedFont>
+      <p:font typeface="Arimo Bold" charset="1" panose="020B0704020202020204"/>
+      <p:regular r:id="rId8"/>
+    </p:embeddedFont>
+    <p:embeddedFont>
+      <p:font typeface="Arimo Italics" charset="1" panose="020B0604020202090204"/>
       <p:regular r:id="rId9"/>
     </p:embeddedFont>
     <p:embeddedFont>
-      <p:font typeface="Arimo" panose="020B0604020202020204" charset="0"/>
+      <p:font typeface="Arimo Bold Italics" charset="1" panose="020B0704020202090204"/>
       <p:regular r:id="rId10"/>
     </p:embeddedFont>
     <p:embeddedFont>
-      <p:font typeface="Calibri" panose="020F0502020204030204" pitchFamily="34" charset="0"/>
+      <p:font typeface="Antonio" charset="1" panose="02000503000000000000"/>
       <p:regular r:id="rId11"/>
-      <p:bold r:id="rId12"/>
-      <p:italic r:id="rId13"/>
-      <p:boldItalic r:id="rId14"/>
     </p:embeddedFont>
     <p:embeddedFont>
-      <p:font typeface="Open Sauce" panose="020B0604020202020204" charset="0"/>
+      <p:font typeface="Antonio Bold" charset="1" panose="02000803000000000000"/>
+      <p:regular r:id="rId12"/>
+    </p:embeddedFont>
+    <p:embeddedFont>
+      <p:font typeface="Antonio Italics" charset="1" panose="02000503000000000000"/>
+      <p:regular r:id="rId13"/>
+    </p:embeddedFont>
+    <p:embeddedFont>
+      <p:font typeface="Antonio Bold Italics" charset="1" panose="02000803000000000000"/>
+      <p:regular r:id="rId14"/>
+    </p:embeddedFont>
+    <p:embeddedFont>
+      <p:font typeface="Antonio Light" charset="1" panose="02000303000000000000"/>
       <p:regular r:id="rId15"/>
     </p:embeddedFont>
     <p:embeddedFont>
-      <p:font typeface="Open Sauce Bold" panose="020B0604020202020204" charset="0"/>
+      <p:font typeface="Antonio Light Italics" charset="1" panose="02000303000000000000"/>
       <p:regular r:id="rId16"/>
     </p:embeddedFont>
     <p:embeddedFont>
-      <p:font typeface="Trocchi" panose="020B0604020202020204" charset="0"/>
+      <p:font typeface="Antonio Ultra-Bold" charset="1" panose="02000803000000000000"/>
       <p:regular r:id="rId17"/>
+    </p:embeddedFont>
+    <p:embeddedFont>
+      <p:font typeface="Antonio Ultra-Bold Italics" charset="1" panose="02000803000000000000"/>
+      <p:regular r:id="rId18"/>
+    </p:embeddedFont>
+    <p:embeddedFont>
+      <p:font typeface="Open Sauce" charset="1" panose="00000500000000000000"/>
+      <p:regular r:id="rId19"/>
+    </p:embeddedFont>
+    <p:embeddedFont>
+      <p:font typeface="Open Sauce Bold" charset="1" panose="00000800000000000000"/>
+      <p:regular r:id="rId20"/>
+    </p:embeddedFont>
+    <p:embeddedFont>
+      <p:font typeface="Open Sauce Italics" charset="1" panose="00000500000000000000"/>
+      <p:regular r:id="rId21"/>
+    </p:embeddedFont>
+    <p:embeddedFont>
+      <p:font typeface="Open Sauce Bold Italics" charset="1" panose="00000800000000000000"/>
+      <p:regular r:id="rId22"/>
+    </p:embeddedFont>
+    <p:embeddedFont>
+      <p:font typeface="Open Sauce Light" charset="1" panose="00000400000000000000"/>
+      <p:regular r:id="rId23"/>
+    </p:embeddedFont>
+    <p:embeddedFont>
+      <p:font typeface="Open Sauce Light Italics" charset="1" panose="00000400000000000000"/>
+      <p:regular r:id="rId24"/>
+    </p:embeddedFont>
+    <p:embeddedFont>
+      <p:font typeface="Open Sauce Medium" charset="1" panose="00000600000000000000"/>
+      <p:regular r:id="rId25"/>
+    </p:embeddedFont>
+    <p:embeddedFont>
+      <p:font typeface="Open Sauce Medium Italics" charset="1" panose="00000600000000000000"/>
+      <p:regular r:id="rId26"/>
+    </p:embeddedFont>
+    <p:embeddedFont>
+      <p:font typeface="Open Sauce Semi-Bold" charset="1" panose="00000700000000000000"/>
+      <p:regular r:id="rId27"/>
+    </p:embeddedFont>
+    <p:embeddedFont>
+      <p:font typeface="Open Sauce Semi-Bold Italics" charset="1" panose="00000700000000000000"/>
+      <p:regular r:id="rId28"/>
+    </p:embeddedFont>
+    <p:embeddedFont>
+      <p:font typeface="Open Sauce Heavy" charset="1" panose="00000A00000000000000"/>
+      <p:regular r:id="rId29"/>
+    </p:embeddedFont>
+    <p:embeddedFont>
+      <p:font typeface="Open Sauce Heavy Italics" charset="1" panose="00000A00000000000000"/>
+      <p:regular r:id="rId30"/>
     </p:embeddedFont>
   </p:embeddedFontLst>
   <p:defaultTextStyle>
@@ -139,22 +212,6 @@
       </a:defRPr>
     </a:lvl9pPr>
   </p:defaultTextStyle>
-  <p:extLst>
-    <p:ext uri="{EFAFB233-063F-42B5-8137-9DF3F51BA10A}">
-      <p15:sldGuideLst xmlns:p15="http://schemas.microsoft.com/office/powerpoint/2012/main">
-        <p15:guide id="1" orient="horz" pos="2160">
-          <p15:clr>
-            <a:srgbClr val="A4A3A4"/>
-          </p15:clr>
-        </p15:guide>
-        <p15:guide id="2" pos="2880">
-          <p15:clr>
-            <a:srgbClr val="A4A3A4"/>
-          </p15:clr>
-        </p15:guide>
-      </p15:sldGuideLst>
-    </p:ext>
-  </p:extLst>
 </p:presentation>
 </file>
 
@@ -196,9 +253,10 @@
           <a:lstStyle/>
           <a:p>
             <a:r>
-              <a:rPr lang="en-US"/>
+              <a:rPr lang="en-US" smtClean="0"/>
               <a:t>Click to edit Master title style</a:t>
             </a:r>
+            <a:endParaRPr lang="en-US"/>
           </a:p>
         </p:txBody>
       </p:sp>
@@ -314,9 +372,10 @@
           </a:lstStyle>
           <a:p>
             <a:r>
-              <a:rPr lang="en-US"/>
+              <a:rPr lang="en-US" smtClean="0"/>
               <a:t>Click to edit Master subtitle style</a:t>
             </a:r>
+            <a:endParaRPr lang="en-US"/>
           </a:p>
         </p:txBody>
       </p:sp>
@@ -338,7 +397,7 @@
             <a:fld id="{1D8BD707-D9CF-40AE-B4C6-C98DA3205C09}" type="datetimeFigureOut">
               <a:rPr lang="en-US" smtClean="0"/>
               <a:pPr/>
-              <a:t>4/18/2024</a:t>
+              <a:t>8/1/2011</a:t>
             </a:fld>
             <a:endParaRPr lang="en-US"/>
           </a:p>
@@ -381,7 +440,7 @@
             <a:fld id="{B6F15528-21DE-4FAA-801E-634DDDAF4B2B}" type="slidenum">
               <a:rPr lang="en-US" smtClean="0"/>
               <a:pPr/>
-              <a:t>‹nº›</a:t>
+              <a:t>‹#›</a:t>
             </a:fld>
             <a:endParaRPr lang="en-US"/>
           </a:p>
@@ -428,9 +487,10 @@
           <a:lstStyle/>
           <a:p>
             <a:r>
-              <a:rPr lang="en-US"/>
+              <a:rPr lang="en-US" smtClean="0"/>
               <a:t>Click to edit Master title style</a:t>
             </a:r>
+            <a:endParaRPr lang="en-US"/>
           </a:p>
         </p:txBody>
       </p:sp>
@@ -451,37 +511,38 @@
           <a:p>
             <a:pPr lvl="0"/>
             <a:r>
-              <a:rPr lang="en-US"/>
+              <a:rPr lang="en-US" smtClean="0"/>
               <a:t>Click to edit Master text styles</a:t>
             </a:r>
           </a:p>
           <a:p>
             <a:pPr lvl="1"/>
             <a:r>
-              <a:rPr lang="en-US"/>
+              <a:rPr lang="en-US" smtClean="0"/>
               <a:t>Second level</a:t>
             </a:r>
           </a:p>
           <a:p>
             <a:pPr lvl="2"/>
             <a:r>
-              <a:rPr lang="en-US"/>
+              <a:rPr lang="en-US" smtClean="0"/>
               <a:t>Third level</a:t>
             </a:r>
           </a:p>
           <a:p>
             <a:pPr lvl="3"/>
             <a:r>
-              <a:rPr lang="en-US"/>
+              <a:rPr lang="en-US" smtClean="0"/>
               <a:t>Fourth level</a:t>
             </a:r>
           </a:p>
           <a:p>
             <a:pPr lvl="4"/>
             <a:r>
-              <a:rPr lang="en-US"/>
+              <a:rPr lang="en-US" smtClean="0"/>
               <a:t>Fifth level</a:t>
             </a:r>
+            <a:endParaRPr lang="en-US"/>
           </a:p>
         </p:txBody>
       </p:sp>
@@ -503,7 +564,7 @@
             <a:fld id="{1D8BD707-D9CF-40AE-B4C6-C98DA3205C09}" type="datetimeFigureOut">
               <a:rPr lang="en-US" smtClean="0"/>
               <a:pPr/>
-              <a:t>4/18/2024</a:t>
+              <a:t>8/1/2011</a:t>
             </a:fld>
             <a:endParaRPr lang="en-US"/>
           </a:p>
@@ -546,7 +607,7 @@
             <a:fld id="{B6F15528-21DE-4FAA-801E-634DDDAF4B2B}" type="slidenum">
               <a:rPr lang="en-US" smtClean="0"/>
               <a:pPr/>
-              <a:t>‹nº›</a:t>
+              <a:t>‹#›</a:t>
             </a:fld>
             <a:endParaRPr lang="en-US"/>
           </a:p>
@@ -598,9 +659,10 @@
           <a:lstStyle/>
           <a:p>
             <a:r>
-              <a:rPr lang="en-US"/>
+              <a:rPr lang="en-US" smtClean="0"/>
               <a:t>Click to edit Master title style</a:t>
             </a:r>
+            <a:endParaRPr lang="en-US"/>
           </a:p>
         </p:txBody>
       </p:sp>
@@ -626,37 +688,38 @@
           <a:p>
             <a:pPr lvl="0"/>
             <a:r>
-              <a:rPr lang="en-US"/>
+              <a:rPr lang="en-US" smtClean="0"/>
               <a:t>Click to edit Master text styles</a:t>
             </a:r>
           </a:p>
           <a:p>
             <a:pPr lvl="1"/>
             <a:r>
-              <a:rPr lang="en-US"/>
+              <a:rPr lang="en-US" smtClean="0"/>
               <a:t>Second level</a:t>
             </a:r>
           </a:p>
           <a:p>
             <a:pPr lvl="2"/>
             <a:r>
-              <a:rPr lang="en-US"/>
+              <a:rPr lang="en-US" smtClean="0"/>
               <a:t>Third level</a:t>
             </a:r>
           </a:p>
           <a:p>
             <a:pPr lvl="3"/>
             <a:r>
-              <a:rPr lang="en-US"/>
+              <a:rPr lang="en-US" smtClean="0"/>
               <a:t>Fourth level</a:t>
             </a:r>
           </a:p>
           <a:p>
             <a:pPr lvl="4"/>
             <a:r>
-              <a:rPr lang="en-US"/>
+              <a:rPr lang="en-US" smtClean="0"/>
               <a:t>Fifth level</a:t>
             </a:r>
+            <a:endParaRPr lang="en-US"/>
           </a:p>
         </p:txBody>
       </p:sp>
@@ -678,7 +741,7 @@
             <a:fld id="{1D8BD707-D9CF-40AE-B4C6-C98DA3205C09}" type="datetimeFigureOut">
               <a:rPr lang="en-US" smtClean="0"/>
               <a:pPr/>
-              <a:t>4/18/2024</a:t>
+              <a:t>8/1/2011</a:t>
             </a:fld>
             <a:endParaRPr lang="en-US"/>
           </a:p>
@@ -721,7 +784,7 @@
             <a:fld id="{B6F15528-21DE-4FAA-801E-634DDDAF4B2B}" type="slidenum">
               <a:rPr lang="en-US" smtClean="0"/>
               <a:pPr/>
-              <a:t>‹nº›</a:t>
+              <a:t>‹#›</a:t>
             </a:fld>
             <a:endParaRPr lang="en-US"/>
           </a:p>
@@ -768,9 +831,10 @@
           <a:lstStyle/>
           <a:p>
             <a:r>
-              <a:rPr lang="en-US"/>
+              <a:rPr lang="en-US" smtClean="0"/>
               <a:t>Click to edit Master title style</a:t>
             </a:r>
+            <a:endParaRPr lang="en-US"/>
           </a:p>
         </p:txBody>
       </p:sp>
@@ -791,37 +855,38 @@
           <a:p>
             <a:pPr lvl="0"/>
             <a:r>
-              <a:rPr lang="en-US"/>
+              <a:rPr lang="en-US" smtClean="0"/>
               <a:t>Click to edit Master text styles</a:t>
             </a:r>
           </a:p>
           <a:p>
             <a:pPr lvl="1"/>
             <a:r>
-              <a:rPr lang="en-US"/>
+              <a:rPr lang="en-US" smtClean="0"/>
               <a:t>Second level</a:t>
             </a:r>
           </a:p>
           <a:p>
             <a:pPr lvl="2"/>
             <a:r>
-              <a:rPr lang="en-US"/>
+              <a:rPr lang="en-US" smtClean="0"/>
               <a:t>Third level</a:t>
             </a:r>
           </a:p>
           <a:p>
             <a:pPr lvl="3"/>
             <a:r>
-              <a:rPr lang="en-US"/>
+              <a:rPr lang="en-US" smtClean="0"/>
               <a:t>Fourth level</a:t>
             </a:r>
           </a:p>
           <a:p>
             <a:pPr lvl="4"/>
             <a:r>
-              <a:rPr lang="en-US"/>
+              <a:rPr lang="en-US" smtClean="0"/>
               <a:t>Fifth level</a:t>
             </a:r>
+            <a:endParaRPr lang="en-US"/>
           </a:p>
         </p:txBody>
       </p:sp>
@@ -843,7 +908,7 @@
             <a:fld id="{1D8BD707-D9CF-40AE-B4C6-C98DA3205C09}" type="datetimeFigureOut">
               <a:rPr lang="en-US" smtClean="0"/>
               <a:pPr/>
-              <a:t>4/18/2024</a:t>
+              <a:t>8/1/2011</a:t>
             </a:fld>
             <a:endParaRPr lang="en-US"/>
           </a:p>
@@ -886,7 +951,7 @@
             <a:fld id="{B6F15528-21DE-4FAA-801E-634DDDAF4B2B}" type="slidenum">
               <a:rPr lang="en-US" smtClean="0"/>
               <a:pPr/>
-              <a:t>‹nº›</a:t>
+              <a:t>‹#›</a:t>
             </a:fld>
             <a:endParaRPr lang="en-US"/>
           </a:p>
@@ -942,9 +1007,10 @@
           </a:lstStyle>
           <a:p>
             <a:r>
-              <a:rPr lang="en-US"/>
+              <a:rPr lang="en-US" smtClean="0"/>
               <a:t>Click to edit Master title style</a:t>
             </a:r>
+            <a:endParaRPr lang="en-US"/>
           </a:p>
         </p:txBody>
       </p:sp>
@@ -1061,7 +1127,7 @@
           <a:p>
             <a:pPr lvl="0"/>
             <a:r>
-              <a:rPr lang="en-US"/>
+              <a:rPr lang="en-US" smtClean="0"/>
               <a:t>Click to edit Master text styles</a:t>
             </a:r>
           </a:p>
@@ -1085,7 +1151,7 @@
             <a:fld id="{1D8BD707-D9CF-40AE-B4C6-C98DA3205C09}" type="datetimeFigureOut">
               <a:rPr lang="en-US" smtClean="0"/>
               <a:pPr/>
-              <a:t>4/18/2024</a:t>
+              <a:t>8/1/2011</a:t>
             </a:fld>
             <a:endParaRPr lang="en-US"/>
           </a:p>
@@ -1128,7 +1194,7 @@
             <a:fld id="{B6F15528-21DE-4FAA-801E-634DDDAF4B2B}" type="slidenum">
               <a:rPr lang="en-US" smtClean="0"/>
               <a:pPr/>
-              <a:t>‹nº›</a:t>
+              <a:t>‹#›</a:t>
             </a:fld>
             <a:endParaRPr lang="en-US"/>
           </a:p>
@@ -1175,9 +1241,10 @@
           <a:lstStyle/>
           <a:p>
             <a:r>
-              <a:rPr lang="en-US"/>
+              <a:rPr lang="en-US" smtClean="0"/>
               <a:t>Click to edit Master title style</a:t>
             </a:r>
+            <a:endParaRPr lang="en-US"/>
           </a:p>
         </p:txBody>
       </p:sp>
@@ -1231,37 +1298,38 @@
           <a:p>
             <a:pPr lvl="0"/>
             <a:r>
-              <a:rPr lang="en-US"/>
+              <a:rPr lang="en-US" smtClean="0"/>
               <a:t>Click to edit Master text styles</a:t>
             </a:r>
           </a:p>
           <a:p>
             <a:pPr lvl="1"/>
             <a:r>
-              <a:rPr lang="en-US"/>
+              <a:rPr lang="en-US" smtClean="0"/>
               <a:t>Second level</a:t>
             </a:r>
           </a:p>
           <a:p>
             <a:pPr lvl="2"/>
             <a:r>
-              <a:rPr lang="en-US"/>
+              <a:rPr lang="en-US" smtClean="0"/>
               <a:t>Third level</a:t>
             </a:r>
           </a:p>
           <a:p>
             <a:pPr lvl="3"/>
             <a:r>
-              <a:rPr lang="en-US"/>
+              <a:rPr lang="en-US" smtClean="0"/>
               <a:t>Fourth level</a:t>
             </a:r>
           </a:p>
           <a:p>
             <a:pPr lvl="4"/>
             <a:r>
-              <a:rPr lang="en-US"/>
+              <a:rPr lang="en-US" smtClean="0"/>
               <a:t>Fifth level</a:t>
             </a:r>
+            <a:endParaRPr lang="en-US"/>
           </a:p>
         </p:txBody>
       </p:sp>
@@ -1315,37 +1383,38 @@
           <a:p>
             <a:pPr lvl="0"/>
             <a:r>
-              <a:rPr lang="en-US"/>
+              <a:rPr lang="en-US" smtClean="0"/>
               <a:t>Click to edit Master text styles</a:t>
             </a:r>
           </a:p>
           <a:p>
             <a:pPr lvl="1"/>
             <a:r>
-              <a:rPr lang="en-US"/>
+              <a:rPr lang="en-US" smtClean="0"/>
               <a:t>Second level</a:t>
             </a:r>
           </a:p>
           <a:p>
             <a:pPr lvl="2"/>
             <a:r>
-              <a:rPr lang="en-US"/>
+              <a:rPr lang="en-US" smtClean="0"/>
               <a:t>Third level</a:t>
             </a:r>
           </a:p>
           <a:p>
             <a:pPr lvl="3"/>
             <a:r>
-              <a:rPr lang="en-US"/>
+              <a:rPr lang="en-US" smtClean="0"/>
               <a:t>Fourth level</a:t>
             </a:r>
           </a:p>
           <a:p>
             <a:pPr lvl="4"/>
             <a:r>
-              <a:rPr lang="en-US"/>
+              <a:rPr lang="en-US" smtClean="0"/>
               <a:t>Fifth level</a:t>
             </a:r>
+            <a:endParaRPr lang="en-US"/>
           </a:p>
         </p:txBody>
       </p:sp>
@@ -1367,7 +1436,7 @@
             <a:fld id="{1D8BD707-D9CF-40AE-B4C6-C98DA3205C09}" type="datetimeFigureOut">
               <a:rPr lang="en-US" smtClean="0"/>
               <a:pPr/>
-              <a:t>4/18/2024</a:t>
+              <a:t>8/1/2011</a:t>
             </a:fld>
             <a:endParaRPr lang="en-US"/>
           </a:p>
@@ -1410,7 +1479,7 @@
             <a:fld id="{B6F15528-21DE-4FAA-801E-634DDDAF4B2B}" type="slidenum">
               <a:rPr lang="en-US" smtClean="0"/>
               <a:pPr/>
-              <a:t>‹nº›</a:t>
+              <a:t>‹#›</a:t>
             </a:fld>
             <a:endParaRPr lang="en-US"/>
           </a:p>
@@ -1461,9 +1530,10 @@
           </a:lstStyle>
           <a:p>
             <a:r>
-              <a:rPr lang="en-US"/>
+              <a:rPr lang="en-US" smtClean="0"/>
               <a:t>Click to edit Master title style</a:t>
             </a:r>
+            <a:endParaRPr lang="en-US"/>
           </a:p>
         </p:txBody>
       </p:sp>
@@ -1526,7 +1596,7 @@
           <a:p>
             <a:pPr lvl="0"/>
             <a:r>
-              <a:rPr lang="en-US"/>
+              <a:rPr lang="en-US" smtClean="0"/>
               <a:t>Click to edit Master text styles</a:t>
             </a:r>
           </a:p>
@@ -1582,37 +1652,38 @@
           <a:p>
             <a:pPr lvl="0"/>
             <a:r>
-              <a:rPr lang="en-US"/>
+              <a:rPr lang="en-US" smtClean="0"/>
               <a:t>Click to edit Master text styles</a:t>
             </a:r>
           </a:p>
           <a:p>
             <a:pPr lvl="1"/>
             <a:r>
-              <a:rPr lang="en-US"/>
+              <a:rPr lang="en-US" smtClean="0"/>
               <a:t>Second level</a:t>
             </a:r>
           </a:p>
           <a:p>
             <a:pPr lvl="2"/>
             <a:r>
-              <a:rPr lang="en-US"/>
+              <a:rPr lang="en-US" smtClean="0"/>
               <a:t>Third level</a:t>
             </a:r>
           </a:p>
           <a:p>
             <a:pPr lvl="3"/>
             <a:r>
-              <a:rPr lang="en-US"/>
+              <a:rPr lang="en-US" smtClean="0"/>
               <a:t>Fourth level</a:t>
             </a:r>
           </a:p>
           <a:p>
             <a:pPr lvl="4"/>
             <a:r>
-              <a:rPr lang="en-US"/>
+              <a:rPr lang="en-US" smtClean="0"/>
               <a:t>Fifth level</a:t>
             </a:r>
+            <a:endParaRPr lang="en-US"/>
           </a:p>
         </p:txBody>
       </p:sp>
@@ -1675,7 +1746,7 @@
           <a:p>
             <a:pPr lvl="0"/>
             <a:r>
-              <a:rPr lang="en-US"/>
+              <a:rPr lang="en-US" smtClean="0"/>
               <a:t>Click to edit Master text styles</a:t>
             </a:r>
           </a:p>
@@ -1731,37 +1802,38 @@
           <a:p>
             <a:pPr lvl="0"/>
             <a:r>
-              <a:rPr lang="en-US"/>
+              <a:rPr lang="en-US" smtClean="0"/>
               <a:t>Click to edit Master text styles</a:t>
             </a:r>
           </a:p>
           <a:p>
             <a:pPr lvl="1"/>
             <a:r>
-              <a:rPr lang="en-US"/>
+              <a:rPr lang="en-US" smtClean="0"/>
               <a:t>Second level</a:t>
             </a:r>
           </a:p>
           <a:p>
             <a:pPr lvl="2"/>
             <a:r>
-              <a:rPr lang="en-US"/>
+              <a:rPr lang="en-US" smtClean="0"/>
               <a:t>Third level</a:t>
             </a:r>
           </a:p>
           <a:p>
             <a:pPr lvl="3"/>
             <a:r>
-              <a:rPr lang="en-US"/>
+              <a:rPr lang="en-US" smtClean="0"/>
               <a:t>Fourth level</a:t>
             </a:r>
           </a:p>
           <a:p>
             <a:pPr lvl="4"/>
             <a:r>
-              <a:rPr lang="en-US"/>
+              <a:rPr lang="en-US" smtClean="0"/>
               <a:t>Fifth level</a:t>
             </a:r>
+            <a:endParaRPr lang="en-US"/>
           </a:p>
         </p:txBody>
       </p:sp>
@@ -1783,7 +1855,7 @@
             <a:fld id="{1D8BD707-D9CF-40AE-B4C6-C98DA3205C09}" type="datetimeFigureOut">
               <a:rPr lang="en-US" smtClean="0"/>
               <a:pPr/>
-              <a:t>4/18/2024</a:t>
+              <a:t>8/1/2011</a:t>
             </a:fld>
             <a:endParaRPr lang="en-US"/>
           </a:p>
@@ -1826,7 +1898,7 @@
             <a:fld id="{B6F15528-21DE-4FAA-801E-634DDDAF4B2B}" type="slidenum">
               <a:rPr lang="en-US" smtClean="0"/>
               <a:pPr/>
-              <a:t>‹nº›</a:t>
+              <a:t>‹#›</a:t>
             </a:fld>
             <a:endParaRPr lang="en-US"/>
           </a:p>
@@ -1873,9 +1945,10 @@
           <a:lstStyle/>
           <a:p>
             <a:r>
-              <a:rPr lang="en-US"/>
+              <a:rPr lang="en-US" smtClean="0"/>
               <a:t>Click to edit Master title style</a:t>
             </a:r>
+            <a:endParaRPr lang="en-US"/>
           </a:p>
         </p:txBody>
       </p:sp>
@@ -1897,7 +1970,7 @@
             <a:fld id="{1D8BD707-D9CF-40AE-B4C6-C98DA3205C09}" type="datetimeFigureOut">
               <a:rPr lang="en-US" smtClean="0"/>
               <a:pPr/>
-              <a:t>4/18/2024</a:t>
+              <a:t>8/1/2011</a:t>
             </a:fld>
             <a:endParaRPr lang="en-US"/>
           </a:p>
@@ -1940,7 +2013,7 @@
             <a:fld id="{B6F15528-21DE-4FAA-801E-634DDDAF4B2B}" type="slidenum">
               <a:rPr lang="en-US" smtClean="0"/>
               <a:pPr/>
-              <a:t>‹nº›</a:t>
+              <a:t>‹#›</a:t>
             </a:fld>
             <a:endParaRPr lang="en-US"/>
           </a:p>
@@ -1989,7 +2062,7 @@
             <a:fld id="{1D8BD707-D9CF-40AE-B4C6-C98DA3205C09}" type="datetimeFigureOut">
               <a:rPr lang="en-US" smtClean="0"/>
               <a:pPr/>
-              <a:t>4/18/2024</a:t>
+              <a:t>8/1/2011</a:t>
             </a:fld>
             <a:endParaRPr lang="en-US"/>
           </a:p>
@@ -2032,7 +2105,7 @@
             <a:fld id="{B6F15528-21DE-4FAA-801E-634DDDAF4B2B}" type="slidenum">
               <a:rPr lang="en-US" smtClean="0"/>
               <a:pPr/>
-              <a:t>‹nº›</a:t>
+              <a:t>‹#›</a:t>
             </a:fld>
             <a:endParaRPr lang="en-US"/>
           </a:p>
@@ -2088,9 +2161,10 @@
           </a:lstStyle>
           <a:p>
             <a:r>
-              <a:rPr lang="en-US"/>
+              <a:rPr lang="en-US" smtClean="0"/>
               <a:t>Click to edit Master title style</a:t>
             </a:r>
+            <a:endParaRPr lang="en-US"/>
           </a:p>
         </p:txBody>
       </p:sp>
@@ -2144,37 +2218,38 @@
           <a:p>
             <a:pPr lvl="0"/>
             <a:r>
-              <a:rPr lang="en-US"/>
+              <a:rPr lang="en-US" smtClean="0"/>
               <a:t>Click to edit Master text styles</a:t>
             </a:r>
           </a:p>
           <a:p>
             <a:pPr lvl="1"/>
             <a:r>
-              <a:rPr lang="en-US"/>
+              <a:rPr lang="en-US" smtClean="0"/>
               <a:t>Second level</a:t>
             </a:r>
           </a:p>
           <a:p>
             <a:pPr lvl="2"/>
             <a:r>
-              <a:rPr lang="en-US"/>
+              <a:rPr lang="en-US" smtClean="0"/>
               <a:t>Third level</a:t>
             </a:r>
           </a:p>
           <a:p>
             <a:pPr lvl="3"/>
             <a:r>
-              <a:rPr lang="en-US"/>
+              <a:rPr lang="en-US" smtClean="0"/>
               <a:t>Fourth level</a:t>
             </a:r>
           </a:p>
           <a:p>
             <a:pPr lvl="4"/>
             <a:r>
-              <a:rPr lang="en-US"/>
+              <a:rPr lang="en-US" smtClean="0"/>
               <a:t>Fifth level</a:t>
             </a:r>
+            <a:endParaRPr lang="en-US"/>
           </a:p>
         </p:txBody>
       </p:sp>
@@ -2237,7 +2312,7 @@
           <a:p>
             <a:pPr lvl="0"/>
             <a:r>
-              <a:rPr lang="en-US"/>
+              <a:rPr lang="en-US" smtClean="0"/>
               <a:t>Click to edit Master text styles</a:t>
             </a:r>
           </a:p>
@@ -2261,7 +2336,7 @@
             <a:fld id="{1D8BD707-D9CF-40AE-B4C6-C98DA3205C09}" type="datetimeFigureOut">
               <a:rPr lang="en-US" smtClean="0"/>
               <a:pPr/>
-              <a:t>4/18/2024</a:t>
+              <a:t>8/1/2011</a:t>
             </a:fld>
             <a:endParaRPr lang="en-US"/>
           </a:p>
@@ -2304,7 +2379,7 @@
             <a:fld id="{B6F15528-21DE-4FAA-801E-634DDDAF4B2B}" type="slidenum">
               <a:rPr lang="en-US" smtClean="0"/>
               <a:pPr/>
-              <a:t>‹nº›</a:t>
+              <a:t>‹#›</a:t>
             </a:fld>
             <a:endParaRPr lang="en-US"/>
           </a:p>
@@ -2360,9 +2435,10 @@
           </a:lstStyle>
           <a:p>
             <a:r>
-              <a:rPr lang="en-US"/>
+              <a:rPr lang="en-US" smtClean="0"/>
               <a:t>Click to edit Master title style</a:t>
             </a:r>
+            <a:endParaRPr lang="en-US"/>
           </a:p>
         </p:txBody>
       </p:sp>
@@ -2486,7 +2562,7 @@
           <a:p>
             <a:pPr lvl="0"/>
             <a:r>
-              <a:rPr lang="en-US"/>
+              <a:rPr lang="en-US" smtClean="0"/>
               <a:t>Click to edit Master text styles</a:t>
             </a:r>
           </a:p>
@@ -2510,7 +2586,7 @@
             <a:fld id="{1D8BD707-D9CF-40AE-B4C6-C98DA3205C09}" type="datetimeFigureOut">
               <a:rPr lang="en-US" smtClean="0"/>
               <a:pPr/>
-              <a:t>4/18/2024</a:t>
+              <a:t>8/1/2011</a:t>
             </a:fld>
             <a:endParaRPr lang="en-US"/>
           </a:p>
@@ -2553,7 +2629,7 @@
             <a:fld id="{B6F15528-21DE-4FAA-801E-634DDDAF4B2B}" type="slidenum">
               <a:rPr lang="en-US" smtClean="0"/>
               <a:pPr/>
-              <a:t>‹nº›</a:t>
+              <a:t>‹#›</a:t>
             </a:fld>
             <a:endParaRPr lang="en-US"/>
           </a:p>
@@ -2615,9 +2691,10 @@
           <a:lstStyle/>
           <a:p>
             <a:r>
-              <a:rPr lang="en-US"/>
+              <a:rPr lang="en-US" smtClean="0"/>
               <a:t>Click to edit Master title style</a:t>
             </a:r>
+            <a:endParaRPr lang="en-US"/>
           </a:p>
         </p:txBody>
       </p:sp>
@@ -2648,37 +2725,38 @@
           <a:p>
             <a:pPr lvl="0"/>
             <a:r>
-              <a:rPr lang="en-US"/>
+              <a:rPr lang="en-US" smtClean="0"/>
               <a:t>Click to edit Master text styles</a:t>
             </a:r>
           </a:p>
           <a:p>
             <a:pPr lvl="1"/>
             <a:r>
-              <a:rPr lang="en-US"/>
+              <a:rPr lang="en-US" smtClean="0"/>
               <a:t>Second level</a:t>
             </a:r>
           </a:p>
           <a:p>
             <a:pPr lvl="2"/>
             <a:r>
-              <a:rPr lang="en-US"/>
+              <a:rPr lang="en-US" smtClean="0"/>
               <a:t>Third level</a:t>
             </a:r>
           </a:p>
           <a:p>
             <a:pPr lvl="3"/>
             <a:r>
-              <a:rPr lang="en-US"/>
+              <a:rPr lang="en-US" smtClean="0"/>
               <a:t>Fourth level</a:t>
             </a:r>
           </a:p>
           <a:p>
             <a:pPr lvl="4"/>
             <a:r>
-              <a:rPr lang="en-US"/>
+              <a:rPr lang="en-US" smtClean="0"/>
               <a:t>Fifth level</a:t>
             </a:r>
+            <a:endParaRPr lang="en-US"/>
           </a:p>
         </p:txBody>
       </p:sp>
@@ -2718,7 +2796,7 @@
             <a:fld id="{1D8BD707-D9CF-40AE-B4C6-C98DA3205C09}" type="datetimeFigureOut">
               <a:rPr lang="en-US" smtClean="0"/>
               <a:pPr/>
-              <a:t>4/18/2024</a:t>
+              <a:t>8/1/2011</a:t>
             </a:fld>
             <a:endParaRPr lang="en-US"/>
           </a:p>
@@ -2797,7 +2875,7 @@
             <a:fld id="{B6F15528-21DE-4FAA-801E-634DDDAF4B2B}" type="slidenum">
               <a:rPr lang="en-US" smtClean="0"/>
               <a:pPr/>
-              <a:t>‹nº›</a:t>
+              <a:t>‹#›</a:t>
             </a:fld>
             <a:endParaRPr lang="en-US"/>
           </a:p>
@@ -3073,7 +3151,7 @@
 </file>
 
 <file path=ppt/slides/slide1.xml><?xml version="1.0" encoding="utf-8"?>
-<p:sld xmlns:a="http://schemas.openxmlformats.org/drawingml/2006/main" xmlns:r="http://schemas.openxmlformats.org/officeDocument/2006/relationships" xmlns:p="http://schemas.openxmlformats.org/presentationml/2006/main">
+<p:sld xmlns:p="http://schemas.openxmlformats.org/presentationml/2006/main" xmlns:a="http://schemas.openxmlformats.org/drawingml/2006/main" xmlns:r="http://schemas.openxmlformats.org/officeDocument/2006/relationships">
   <p:cSld>
     <p:spTree>
       <p:nvGrpSpPr>
@@ -3091,12 +3169,12 @@
       </p:grpSpPr>
       <p:grpSp>
         <p:nvGrpSpPr>
-          <p:cNvPr id="2" name="Group 2"/>
+          <p:cNvPr name="Group 2" id="2"/>
           <p:cNvGrpSpPr/>
           <p:nvPr/>
         </p:nvGrpSpPr>
         <p:grpSpPr>
-          <a:xfrm>
+          <a:xfrm rot="0">
             <a:off x="13188304" y="-1513365"/>
             <a:ext cx="13313729" cy="13313729"/>
             <a:chOff x="0" y="0"/>
@@ -3105,12 +3183,12 @@
         </p:grpSpPr>
         <p:sp>
           <p:nvSpPr>
-            <p:cNvPr id="3" name="Freeform 3"/>
+            <p:cNvPr name="Freeform 3" id="3"/>
             <p:cNvSpPr/>
             <p:nvPr/>
           </p:nvSpPr>
           <p:spPr>
-            <a:xfrm>
+            <a:xfrm flipH="false" flipV="false" rot="0">
               <a:off x="0" y="0"/>
               <a:ext cx="6350000" cy="6350000"/>
             </a:xfrm>
@@ -3119,9 +3197,9 @@
               <a:gdLst/>
               <a:ahLst/>
               <a:cxnLst/>
-              <a:rect l="l" t="t" r="r" b="b"/>
+              <a:rect r="r" b="b" t="t" l="l"/>
               <a:pathLst>
-                <a:path w="6350000" h="6350000">
+                <a:path h="6350000" w="6350000">
                   <a:moveTo>
                     <a:pt x="3175000" y="0"/>
                   </a:moveTo>
@@ -3157,7 +3235,7 @@
       </p:grpSp>
       <p:grpSp>
         <p:nvGrpSpPr>
-          <p:cNvPr id="4" name="Group 4"/>
+          <p:cNvPr name="Group 4" id="4"/>
           <p:cNvGrpSpPr/>
           <p:nvPr/>
         </p:nvGrpSpPr>
@@ -3171,12 +3249,12 @@
         </p:grpSpPr>
         <p:sp>
           <p:nvSpPr>
-            <p:cNvPr id="5" name="Freeform 5"/>
+            <p:cNvPr name="Freeform 5" id="5"/>
             <p:cNvSpPr/>
             <p:nvPr/>
           </p:nvSpPr>
           <p:spPr>
-            <a:xfrm>
+            <a:xfrm flipH="false" flipV="false" rot="0">
               <a:off x="19050" y="19050"/>
               <a:ext cx="4022947" cy="2195449"/>
             </a:xfrm>
@@ -3185,9 +3263,9 @@
               <a:gdLst/>
               <a:ahLst/>
               <a:cxnLst/>
-              <a:rect l="l" t="t" r="r" b="b"/>
+              <a:rect r="r" b="b" t="t" l="l"/>
               <a:pathLst>
-                <a:path w="4022947" h="2195449">
+                <a:path h="2195449" w="4022947">
                   <a:moveTo>
                     <a:pt x="2925031" y="2195449"/>
                   </a:moveTo>
@@ -3228,12 +3306,12 @@
         </p:sp>
         <p:sp>
           <p:nvSpPr>
-            <p:cNvPr id="6" name="Freeform 6"/>
+            <p:cNvPr name="Freeform 6" id="6"/>
             <p:cNvSpPr/>
             <p:nvPr/>
           </p:nvSpPr>
           <p:spPr>
-            <a:xfrm>
+            <a:xfrm flipH="false" flipV="false" rot="0">
               <a:off x="0" y="0"/>
               <a:ext cx="4060920" cy="2233549"/>
             </a:xfrm>
@@ -3242,9 +3320,9 @@
               <a:gdLst/>
               <a:ahLst/>
               <a:cxnLst/>
-              <a:rect l="l" t="t" r="r" b="b"/>
+              <a:rect r="r" b="b" t="t" l="l"/>
               <a:pathLst>
-                <a:path w="4060920" h="2233549">
+                <a:path h="2233549" w="4060920">
                   <a:moveTo>
                     <a:pt x="2944081" y="2233549"/>
                   </a:moveTo>
@@ -3316,12 +3394,12 @@
       </p:grpSp>
       <p:grpSp>
         <p:nvGrpSpPr>
-          <p:cNvPr id="7" name="Group 7"/>
+          <p:cNvPr name="Group 7" id="7"/>
           <p:cNvGrpSpPr/>
           <p:nvPr/>
         </p:nvGrpSpPr>
         <p:grpSpPr>
-          <a:xfrm>
+          <a:xfrm rot="0">
             <a:off x="11207104" y="2944648"/>
             <a:ext cx="5246391" cy="5246370"/>
             <a:chOff x="0" y="0"/>
@@ -3330,12 +3408,12 @@
         </p:grpSpPr>
         <p:sp>
           <p:nvSpPr>
-            <p:cNvPr id="8" name="Freeform 8"/>
+            <p:cNvPr name="Freeform 8" id="8"/>
             <p:cNvSpPr/>
             <p:nvPr/>
           </p:nvSpPr>
           <p:spPr>
-            <a:xfrm>
+            <a:xfrm flipH="false" flipV="false" rot="0">
               <a:off x="0" y="0"/>
               <a:ext cx="6350000" cy="6349975"/>
             </a:xfrm>
@@ -3344,9 +3422,9 @@
               <a:gdLst/>
               <a:ahLst/>
               <a:cxnLst/>
-              <a:rect l="l" t="t" r="r" b="b"/>
+              <a:rect r="r" b="b" t="t" l="l"/>
               <a:pathLst>
-                <a:path w="6350000" h="6349975">
+                <a:path h="6349975" w="6350000">
                   <a:moveTo>
                     <a:pt x="6350000" y="3175025"/>
                   </a:moveTo>
@@ -3377,7 +3455,7 @@
             <a:blipFill>
               <a:blip r:embed="rId2"/>
               <a:stretch>
-                <a:fillRect/>
+                <a:fillRect l="0" t="0" r="0" b="0"/>
               </a:stretch>
             </a:blipFill>
           </p:spPr>
@@ -3385,12 +3463,12 @@
       </p:grpSp>
       <p:grpSp>
         <p:nvGrpSpPr>
-          <p:cNvPr id="9" name="Group 9"/>
+          <p:cNvPr name="Group 9" id="9"/>
           <p:cNvGrpSpPr/>
           <p:nvPr/>
         </p:nvGrpSpPr>
         <p:grpSpPr>
-          <a:xfrm>
+          <a:xfrm rot="0">
             <a:off x="759749" y="3543457"/>
             <a:ext cx="10610347" cy="3200086"/>
             <a:chOff x="0" y="0"/>
@@ -3399,12 +3477,12 @@
         </p:grpSpPr>
         <p:sp>
           <p:nvSpPr>
-            <p:cNvPr id="10" name="TextBox 10"/>
-            <p:cNvSpPr txBox="1"/>
+            <p:cNvPr name="TextBox 10" id="10"/>
+            <p:cNvSpPr txBox="true"/>
             <p:nvPr/>
           </p:nvSpPr>
           <p:spPr>
-            <a:xfrm>
+            <a:xfrm rot="0">
               <a:off x="0" y="133350"/>
               <a:ext cx="14147130" cy="2914650"/>
             </a:xfrm>
@@ -3413,7 +3491,7 @@
             </a:prstGeom>
           </p:spPr>
           <p:txBody>
-            <a:bodyPr lIns="0" tIns="0" rIns="0" bIns="0" rtlCol="0" anchor="t">
+            <a:bodyPr anchor="t" rtlCol="false" tIns="0" lIns="0" bIns="0" rIns="0">
               <a:spAutoFit/>
             </a:bodyPr>
             <a:lstStyle/>
@@ -3437,12 +3515,12 @@
         </p:sp>
         <p:sp>
           <p:nvSpPr>
-            <p:cNvPr id="11" name="TextBox 11"/>
-            <p:cNvSpPr txBox="1"/>
+            <p:cNvPr name="TextBox 11" id="11"/>
+            <p:cNvSpPr txBox="true"/>
             <p:nvPr/>
           </p:nvSpPr>
           <p:spPr>
-            <a:xfrm>
+            <a:xfrm rot="0">
               <a:off x="0" y="3174967"/>
               <a:ext cx="14147130" cy="1091847"/>
             </a:xfrm>
@@ -3451,7 +3529,7 @@
             </a:prstGeom>
           </p:spPr>
           <p:txBody>
-            <a:bodyPr lIns="0" tIns="0" rIns="0" bIns="0" rtlCol="0" anchor="t">
+            <a:bodyPr anchor="t" rtlCol="false" tIns="0" lIns="0" bIns="0" rIns="0">
               <a:spAutoFit/>
             </a:bodyPr>
             <a:lstStyle/>
@@ -3499,14 +3577,13 @@
 </file>
 
 <file path=ppt/slides/slide2.xml><?xml version="1.0" encoding="utf-8"?>
-<p:sld xmlns:a="http://schemas.openxmlformats.org/drawingml/2006/main" xmlns:r="http://schemas.openxmlformats.org/officeDocument/2006/relationships" xmlns:p="http://schemas.openxmlformats.org/presentationml/2006/main">
+<p:sld xmlns:p="http://schemas.openxmlformats.org/presentationml/2006/main" xmlns:a="http://schemas.openxmlformats.org/drawingml/2006/main" xmlns:r="http://schemas.openxmlformats.org/officeDocument/2006/relationships">
   <p:cSld>
     <p:bg>
       <p:bgPr>
         <a:solidFill>
           <a:srgbClr val="0B2C40"/>
         </a:solidFill>
-        <a:effectLst/>
       </p:bgPr>
     </p:bg>
     <p:spTree>
@@ -3525,12 +3602,12 @@
       </p:grpSpPr>
       <p:grpSp>
         <p:nvGrpSpPr>
-          <p:cNvPr id="2" name="Group 2"/>
+          <p:cNvPr name="Group 2" id="2"/>
           <p:cNvGrpSpPr/>
           <p:nvPr/>
         </p:nvGrpSpPr>
         <p:grpSpPr>
-          <a:xfrm>
+          <a:xfrm rot="0">
             <a:off x="-2461183" y="-680073"/>
             <a:ext cx="11605183" cy="12447258"/>
             <a:chOff x="0" y="0"/>
@@ -3539,12 +3616,12 @@
         </p:grpSpPr>
         <p:sp>
           <p:nvSpPr>
-            <p:cNvPr id="3" name="Freeform 3"/>
+            <p:cNvPr name="Freeform 3" id="3"/>
             <p:cNvSpPr/>
             <p:nvPr/>
           </p:nvSpPr>
           <p:spPr>
-            <a:xfrm>
+            <a:xfrm flipH="false" flipV="false" rot="0">
               <a:off x="0" y="0"/>
               <a:ext cx="5920390" cy="6349975"/>
             </a:xfrm>
@@ -3553,9 +3630,9 @@
               <a:gdLst/>
               <a:ahLst/>
               <a:cxnLst/>
-              <a:rect l="l" t="t" r="r" b="b"/>
+              <a:rect r="r" b="b" t="t" l="l"/>
               <a:pathLst>
-                <a:path w="5920390" h="6349975">
+                <a:path h="6349975" w="5920390">
                   <a:moveTo>
                     <a:pt x="5920390" y="3175025"/>
                   </a:moveTo>
@@ -3586,7 +3663,7 @@
             <a:blipFill>
               <a:blip r:embed="rId2"/>
               <a:stretch>
-                <a:fillRect l="-3628" r="-3628"/>
+                <a:fillRect l="-3628" t="0" r="-3628" b="0"/>
               </a:stretch>
             </a:blipFill>
           </p:spPr>
@@ -3594,12 +3671,12 @@
       </p:grpSp>
       <p:grpSp>
         <p:nvGrpSpPr>
-          <p:cNvPr id="4" name="Group 4"/>
+          <p:cNvPr name="Group 4" id="4"/>
           <p:cNvGrpSpPr/>
           <p:nvPr/>
         </p:nvGrpSpPr>
         <p:grpSpPr>
-          <a:xfrm>
+          <a:xfrm rot="0">
             <a:off x="747554" y="730685"/>
             <a:ext cx="5029894" cy="1769215"/>
             <a:chOff x="0" y="0"/>
@@ -3608,12 +3685,12 @@
         </p:grpSpPr>
         <p:sp>
           <p:nvSpPr>
-            <p:cNvPr id="5" name="Freeform 5"/>
+            <p:cNvPr name="Freeform 5" id="5"/>
             <p:cNvSpPr/>
             <p:nvPr/>
           </p:nvSpPr>
           <p:spPr>
-            <a:xfrm>
+            <a:xfrm flipH="false" flipV="false" rot="0">
               <a:off x="19050" y="19050"/>
               <a:ext cx="6312027" cy="2195449"/>
             </a:xfrm>
@@ -3622,9 +3699,9 @@
               <a:gdLst/>
               <a:ahLst/>
               <a:cxnLst/>
-              <a:rect l="l" t="t" r="r" b="b"/>
+              <a:rect r="r" b="b" t="t" l="l"/>
               <a:pathLst>
-                <a:path w="6312027" h="2195449">
+                <a:path h="2195449" w="6312027">
                   <a:moveTo>
                     <a:pt x="5214112" y="2195449"/>
                   </a:moveTo>
@@ -3665,12 +3742,12 @@
         </p:sp>
         <p:sp>
           <p:nvSpPr>
-            <p:cNvPr id="6" name="Freeform 6"/>
+            <p:cNvPr name="Freeform 6" id="6"/>
             <p:cNvSpPr/>
             <p:nvPr/>
           </p:nvSpPr>
           <p:spPr>
-            <a:xfrm>
+            <a:xfrm flipH="false" flipV="false" rot="0">
               <a:off x="0" y="0"/>
               <a:ext cx="6350000" cy="2233549"/>
             </a:xfrm>
@@ -3679,9 +3756,9 @@
               <a:gdLst/>
               <a:ahLst/>
               <a:cxnLst/>
-              <a:rect l="l" t="t" r="r" b="b"/>
+              <a:rect r="r" b="b" t="t" l="l"/>
               <a:pathLst>
-                <a:path w="6350000" h="2233549">
+                <a:path h="2233549" w="6350000">
                   <a:moveTo>
                     <a:pt x="5233162" y="2233549"/>
                   </a:moveTo>
@@ -3753,12 +3830,12 @@
       </p:grpSp>
       <p:sp>
         <p:nvSpPr>
-          <p:cNvPr id="7" name="TextBox 7"/>
-          <p:cNvSpPr txBox="1"/>
+          <p:cNvPr name="TextBox 7" id="7"/>
+          <p:cNvSpPr txBox="true"/>
           <p:nvPr/>
         </p:nvSpPr>
         <p:spPr>
-          <a:xfrm>
+          <a:xfrm rot="0">
             <a:off x="1246910" y="1087709"/>
             <a:ext cx="4031182" cy="1047750"/>
           </a:xfrm>
@@ -3767,12 +3844,12 @@
           </a:prstGeom>
         </p:spPr>
         <p:txBody>
-          <a:bodyPr lIns="0" tIns="0" rIns="0" bIns="0" rtlCol="0" anchor="t">
+          <a:bodyPr anchor="t" rtlCol="false" tIns="0" lIns="0" bIns="0" rIns="0">
             <a:spAutoFit/>
           </a:bodyPr>
           <a:lstStyle/>
           <a:p>
-            <a:pPr marL="0" lvl="0" indent="0" algn="ctr">
+            <a:pPr algn="ctr" marL="0" indent="0" lvl="0">
               <a:lnSpc>
                 <a:spcPts val="8399"/>
               </a:lnSpc>
@@ -3791,21 +3868,21 @@
       </p:sp>
       <p:sp>
         <p:nvSpPr>
-          <p:cNvPr id="8" name="TextBox 8"/>
-          <p:cNvSpPr txBox="1"/>
+          <p:cNvPr name="TextBox 8" id="8"/>
+          <p:cNvSpPr txBox="true"/>
           <p:nvPr/>
         </p:nvSpPr>
         <p:spPr>
-          <a:xfrm>
+          <a:xfrm rot="0">
             <a:off x="9773854" y="1930370"/>
-            <a:ext cx="7946457" cy="5574539"/>
+            <a:ext cx="7946457" cy="6254810"/>
           </a:xfrm>
           <a:prstGeom prst="rect">
             <a:avLst/>
           </a:prstGeom>
         </p:spPr>
         <p:txBody>
-          <a:bodyPr lIns="0" tIns="0" rIns="0" bIns="0" rtlCol="0" anchor="t">
+          <a:bodyPr anchor="t" rtlCol="false" tIns="0" lIns="0" bIns="0" rIns="0">
             <a:spAutoFit/>
           </a:bodyPr>
           <a:lstStyle/>
@@ -3816,29 +3893,30 @@
               </a:lnSpc>
             </a:pPr>
             <a:r>
-              <a:rPr lang="en-US" sz="3636" dirty="0">
+              <a:rPr lang="en-US" sz="3636">
                 <a:solidFill>
                   <a:srgbClr val="FFFFFF"/>
                 </a:solidFill>
                 <a:latin typeface="Trocchi"/>
               </a:rPr>
-              <a:t>- Pitch do </a:t>
-            </a:r>
-            <a:r>
-              <a:rPr lang="en-US" sz="3636" dirty="0" err="1">
+              <a:t>- Pitch do projeto</a:t>
+            </a:r>
+          </a:p>
+          <a:p>
+            <a:pPr>
+              <a:lnSpc>
+                <a:spcPts val="6255"/>
+              </a:lnSpc>
+            </a:pPr>
+            <a:r>
+              <a:rPr lang="en-US" sz="3636">
                 <a:solidFill>
                   <a:srgbClr val="FFFFFF"/>
                 </a:solidFill>
                 <a:latin typeface="Trocchi"/>
               </a:rPr>
-              <a:t>projeto</a:t>
-            </a:r>
-            <a:endParaRPr lang="en-US" sz="3636" dirty="0">
-              <a:solidFill>
-                <a:srgbClr val="FFFFFF"/>
-              </a:solidFill>
-              <a:latin typeface="Trocchi"/>
-            </a:endParaRPr>
+              <a:t>- Funcionamento da arquitetura;</a:t>
+            </a:r>
           </a:p>
           <a:p>
             <a:pPr>
@@ -3847,292 +3925,61 @@
               </a:lnSpc>
             </a:pPr>
             <a:r>
-              <a:rPr lang="en-US" sz="3636" dirty="0">
+              <a:rPr lang="en-US" sz="3636">
                 <a:solidFill>
                   <a:srgbClr val="FFFFFF"/>
                 </a:solidFill>
                 <a:latin typeface="Trocchi"/>
               </a:rPr>
-              <a:t>- </a:t>
-            </a:r>
-            <a:r>
-              <a:rPr lang="en-US" sz="3636" dirty="0" err="1">
+              <a:t>- Como surgiu </a:t>
+            </a:r>
+          </a:p>
+          <a:p>
+            <a:pPr>
+              <a:lnSpc>
+                <a:spcPts val="6255"/>
+              </a:lnSpc>
+            </a:pPr>
+            <a:r>
+              <a:rPr lang="en-US" sz="3636">
                 <a:solidFill>
                   <a:srgbClr val="FFFFFF"/>
                 </a:solidFill>
                 <a:latin typeface="Trocchi"/>
               </a:rPr>
-              <a:t>Funcionamento</a:t>
-            </a:r>
-            <a:r>
-              <a:rPr lang="en-US" sz="3636" dirty="0">
+              <a:t>- Com qual propósito;</a:t>
+            </a:r>
+          </a:p>
+          <a:p>
+            <a:pPr>
+              <a:lnSpc>
+                <a:spcPts val="6255"/>
+              </a:lnSpc>
+            </a:pPr>
+            <a:r>
+              <a:rPr lang="en-US" sz="3636">
                 <a:solidFill>
                   <a:srgbClr val="FFFFFF"/>
                 </a:solidFill>
                 <a:latin typeface="Trocchi"/>
               </a:rPr>
-              <a:t> da </a:t>
-            </a:r>
-            <a:r>
-              <a:rPr lang="en-US" sz="3636" dirty="0" err="1">
+              <a:t>- Quais problemas que essa arquitetura resolve;</a:t>
+            </a:r>
+          </a:p>
+          <a:p>
+            <a:pPr>
+              <a:lnSpc>
+                <a:spcPts val="6255"/>
+              </a:lnSpc>
+            </a:pPr>
+            <a:r>
+              <a:rPr lang="en-US" sz="3636">
                 <a:solidFill>
                   <a:srgbClr val="FFFFFF"/>
                 </a:solidFill>
                 <a:latin typeface="Trocchi"/>
               </a:rPr>
-              <a:t>arquitetura</a:t>
-            </a:r>
-            <a:endParaRPr lang="en-US" sz="3636" dirty="0">
-              <a:solidFill>
-                <a:srgbClr val="FFFFFF"/>
-              </a:solidFill>
-              <a:latin typeface="Trocchi"/>
-            </a:endParaRPr>
-          </a:p>
-          <a:p>
-            <a:pPr>
-              <a:lnSpc>
-                <a:spcPts val="6255"/>
-              </a:lnSpc>
-            </a:pPr>
-            <a:r>
-              <a:rPr lang="en-US" sz="3636" dirty="0">
-                <a:solidFill>
-                  <a:srgbClr val="FFFFFF"/>
-                </a:solidFill>
-                <a:latin typeface="Trocchi"/>
-              </a:rPr>
-              <a:t>- Como </a:t>
-            </a:r>
-            <a:r>
-              <a:rPr lang="en-US" sz="3636" dirty="0" err="1">
-                <a:solidFill>
-                  <a:srgbClr val="FFFFFF"/>
-                </a:solidFill>
-                <a:latin typeface="Trocchi"/>
-              </a:rPr>
-              <a:t>surgiu</a:t>
-            </a:r>
-            <a:r>
-              <a:rPr lang="en-US" sz="3636" dirty="0">
-                <a:solidFill>
-                  <a:srgbClr val="FFFFFF"/>
-                </a:solidFill>
-                <a:latin typeface="Trocchi"/>
-              </a:rPr>
-              <a:t>?</a:t>
-            </a:r>
-          </a:p>
-          <a:p>
-            <a:pPr>
-              <a:lnSpc>
-                <a:spcPts val="6255"/>
-              </a:lnSpc>
-            </a:pPr>
-            <a:r>
-              <a:rPr lang="en-US" sz="3636" dirty="0">
-                <a:solidFill>
-                  <a:srgbClr val="FFFFFF"/>
-                </a:solidFill>
-                <a:latin typeface="Trocchi"/>
-              </a:rPr>
-              <a:t>- </a:t>
-            </a:r>
-            <a:r>
-              <a:rPr lang="en-US" sz="3636" dirty="0" err="1">
-                <a:solidFill>
-                  <a:srgbClr val="FFFFFF"/>
-                </a:solidFill>
-                <a:latin typeface="Trocchi"/>
-              </a:rPr>
-              <a:t>Quais</a:t>
-            </a:r>
-            <a:r>
-              <a:rPr lang="en-US" sz="3636" dirty="0">
-                <a:solidFill>
-                  <a:srgbClr val="FFFFFF"/>
-                </a:solidFill>
-                <a:latin typeface="Trocchi"/>
-              </a:rPr>
-              <a:t> </a:t>
-            </a:r>
-            <a:r>
-              <a:rPr lang="en-US" sz="3636" dirty="0" err="1">
-                <a:solidFill>
-                  <a:srgbClr val="FFFFFF"/>
-                </a:solidFill>
-                <a:latin typeface="Trocchi"/>
-              </a:rPr>
-              <a:t>problemas</a:t>
-            </a:r>
-            <a:r>
-              <a:rPr lang="en-US" sz="3636" dirty="0">
-                <a:solidFill>
-                  <a:srgbClr val="FFFFFF"/>
-                </a:solidFill>
-                <a:latin typeface="Trocchi"/>
-              </a:rPr>
-              <a:t> que </a:t>
-            </a:r>
-            <a:r>
-              <a:rPr lang="en-US" sz="3636" dirty="0" err="1">
-                <a:solidFill>
-                  <a:srgbClr val="FFFFFF"/>
-                </a:solidFill>
-                <a:latin typeface="Trocchi"/>
-              </a:rPr>
-              <a:t>essa</a:t>
-            </a:r>
-            <a:r>
-              <a:rPr lang="en-US" sz="3636" dirty="0">
-                <a:solidFill>
-                  <a:srgbClr val="FFFFFF"/>
-                </a:solidFill>
-                <a:latin typeface="Trocchi"/>
-              </a:rPr>
-              <a:t> </a:t>
-            </a:r>
-            <a:r>
-              <a:rPr lang="en-US" sz="3636" dirty="0" err="1">
-                <a:solidFill>
-                  <a:srgbClr val="FFFFFF"/>
-                </a:solidFill>
-                <a:latin typeface="Trocchi"/>
-              </a:rPr>
-              <a:t>arquitetura</a:t>
-            </a:r>
-            <a:r>
-              <a:rPr lang="en-US" sz="3636" dirty="0">
-                <a:solidFill>
-                  <a:srgbClr val="FFFFFF"/>
-                </a:solidFill>
-                <a:latin typeface="Trocchi"/>
-              </a:rPr>
-              <a:t> resolve?</a:t>
-            </a:r>
-          </a:p>
-          <a:p>
-            <a:pPr>
-              <a:lnSpc>
-                <a:spcPts val="6255"/>
-              </a:lnSpc>
-            </a:pPr>
-            <a:r>
-              <a:rPr lang="en-US" sz="3636" dirty="0">
-                <a:solidFill>
-                  <a:srgbClr val="FFFFFF"/>
-                </a:solidFill>
-                <a:latin typeface="Trocchi"/>
-              </a:rPr>
-              <a:t>- </a:t>
-            </a:r>
-            <a:r>
-              <a:rPr lang="en-US" sz="3636" dirty="0" err="1">
-                <a:solidFill>
-                  <a:srgbClr val="FFFFFF"/>
-                </a:solidFill>
-                <a:latin typeface="Trocchi"/>
-              </a:rPr>
-              <a:t>Quais</a:t>
-            </a:r>
-            <a:r>
-              <a:rPr lang="en-US" sz="3636" dirty="0">
-                <a:solidFill>
-                  <a:srgbClr val="FFFFFF"/>
-                </a:solidFill>
-                <a:latin typeface="Trocchi"/>
-              </a:rPr>
-              <a:t> </a:t>
-            </a:r>
-            <a:r>
-              <a:rPr lang="en-US" sz="3636" dirty="0" err="1">
-                <a:solidFill>
-                  <a:srgbClr val="FFFFFF"/>
-                </a:solidFill>
-                <a:latin typeface="Trocchi"/>
-              </a:rPr>
-              <a:t>problemas</a:t>
-            </a:r>
-            <a:r>
-              <a:rPr lang="en-US" sz="3636" dirty="0">
-                <a:solidFill>
-                  <a:srgbClr val="FFFFFF"/>
-                </a:solidFill>
-                <a:latin typeface="Trocchi"/>
-              </a:rPr>
-              <a:t> que </a:t>
-            </a:r>
-            <a:r>
-              <a:rPr lang="en-US" sz="3636" dirty="0" err="1">
-                <a:solidFill>
-                  <a:srgbClr val="FFFFFF"/>
-                </a:solidFill>
-                <a:latin typeface="Trocchi"/>
-              </a:rPr>
-              <a:t>ainda</a:t>
-            </a:r>
-            <a:r>
-              <a:rPr lang="en-US" sz="3636" dirty="0">
-                <a:solidFill>
-                  <a:srgbClr val="FFFFFF"/>
-                </a:solidFill>
-                <a:latin typeface="Trocchi"/>
-              </a:rPr>
-              <a:t> </a:t>
-            </a:r>
-            <a:r>
-              <a:rPr lang="en-US" sz="3636" dirty="0" err="1">
-                <a:solidFill>
-                  <a:srgbClr val="FFFFFF"/>
-                </a:solidFill>
-                <a:latin typeface="Trocchi"/>
-              </a:rPr>
-              <a:t>existe</a:t>
-            </a:r>
-            <a:r>
-              <a:rPr lang="en-US" sz="3636" dirty="0">
-                <a:solidFill>
-                  <a:srgbClr val="FFFFFF"/>
-                </a:solidFill>
-                <a:latin typeface="Trocchi"/>
-              </a:rPr>
-              <a:t> </a:t>
-            </a:r>
-            <a:r>
-              <a:rPr lang="en-US" sz="3636" dirty="0" err="1">
-                <a:solidFill>
-                  <a:srgbClr val="FFFFFF"/>
-                </a:solidFill>
-                <a:latin typeface="Trocchi"/>
-              </a:rPr>
-              <a:t>nesse</a:t>
-            </a:r>
-            <a:r>
-              <a:rPr lang="en-US" sz="3636" dirty="0">
-                <a:solidFill>
-                  <a:srgbClr val="FFFFFF"/>
-                </a:solidFill>
-                <a:latin typeface="Trocchi"/>
-              </a:rPr>
-              <a:t> </a:t>
-            </a:r>
-            <a:r>
-              <a:rPr lang="en-US" sz="3636" dirty="0" err="1">
-                <a:solidFill>
-                  <a:srgbClr val="FFFFFF"/>
-                </a:solidFill>
-                <a:latin typeface="Trocchi"/>
-              </a:rPr>
-              <a:t>modelo</a:t>
-            </a:r>
-            <a:r>
-              <a:rPr lang="en-US" sz="3636" dirty="0">
-                <a:solidFill>
-                  <a:srgbClr val="FFFFFF"/>
-                </a:solidFill>
-                <a:latin typeface="Trocchi"/>
-              </a:rPr>
-              <a:t>?</a:t>
+              <a:t>- Quais problemas que ainda existe nesse modelo;</a:t>
             </a:r>
           </a:p>
         </p:txBody>
@@ -4146,7 +3993,7 @@
 </file>
 
 <file path=ppt/slides/slide3.xml><?xml version="1.0" encoding="utf-8"?>
-<p:sld xmlns:a="http://schemas.openxmlformats.org/drawingml/2006/main" xmlns:r="http://schemas.openxmlformats.org/officeDocument/2006/relationships" xmlns:p="http://schemas.openxmlformats.org/presentationml/2006/main">
+<p:sld xmlns:p="http://schemas.openxmlformats.org/presentationml/2006/main" xmlns:a="http://schemas.openxmlformats.org/drawingml/2006/main" xmlns:r="http://schemas.openxmlformats.org/officeDocument/2006/relationships">
   <p:cSld>
     <p:spTree>
       <p:nvGrpSpPr>
@@ -4164,12 +4011,12 @@
       </p:grpSpPr>
       <p:sp>
         <p:nvSpPr>
-          <p:cNvPr id="2" name="AutoShape 2"/>
+          <p:cNvPr name="AutoShape 2" id="2"/>
           <p:cNvSpPr/>
           <p:nvPr/>
         </p:nvSpPr>
         <p:spPr>
-          <a:xfrm>
+          <a:xfrm rot="0">
             <a:off x="0" y="0"/>
             <a:ext cx="7886701" cy="10287000"/>
           </a:xfrm>
@@ -4183,7 +4030,7 @@
       </p:sp>
       <p:grpSp>
         <p:nvGrpSpPr>
-          <p:cNvPr id="3" name="Group 3"/>
+          <p:cNvPr name="Group 3" id="3"/>
           <p:cNvGrpSpPr/>
           <p:nvPr/>
         </p:nvGrpSpPr>
@@ -4197,12 +4044,12 @@
         </p:grpSpPr>
         <p:sp>
           <p:nvSpPr>
-            <p:cNvPr id="4" name="Freeform 4"/>
+            <p:cNvPr name="Freeform 4" id="4"/>
             <p:cNvSpPr/>
             <p:nvPr/>
           </p:nvSpPr>
           <p:spPr>
-            <a:xfrm>
+            <a:xfrm flipH="false" flipV="false" rot="0">
               <a:off x="19050" y="19050"/>
               <a:ext cx="4022947" cy="2195449"/>
             </a:xfrm>
@@ -4211,9 +4058,9 @@
               <a:gdLst/>
               <a:ahLst/>
               <a:cxnLst/>
-              <a:rect l="l" t="t" r="r" b="b"/>
+              <a:rect r="r" b="b" t="t" l="l"/>
               <a:pathLst>
-                <a:path w="4022947" h="2195449">
+                <a:path h="2195449" w="4022947">
                   <a:moveTo>
                     <a:pt x="2925031" y="2195449"/>
                   </a:moveTo>
@@ -4254,12 +4101,12 @@
         </p:sp>
         <p:sp>
           <p:nvSpPr>
-            <p:cNvPr id="5" name="Freeform 5"/>
+            <p:cNvPr name="Freeform 5" id="5"/>
             <p:cNvSpPr/>
             <p:nvPr/>
           </p:nvSpPr>
           <p:spPr>
-            <a:xfrm>
+            <a:xfrm flipH="false" flipV="false" rot="0">
               <a:off x="0" y="0"/>
               <a:ext cx="4060920" cy="2233549"/>
             </a:xfrm>
@@ -4268,9 +4115,9 @@
               <a:gdLst/>
               <a:ahLst/>
               <a:cxnLst/>
-              <a:rect l="l" t="t" r="r" b="b"/>
+              <a:rect r="r" b="b" t="t" l="l"/>
               <a:pathLst>
-                <a:path w="4060920" h="2233549">
+                <a:path h="2233549" w="4060920">
                   <a:moveTo>
                     <a:pt x="2944081" y="2233549"/>
                   </a:moveTo>
@@ -4342,12 +4189,12 @@
       </p:grpSp>
       <p:grpSp>
         <p:nvGrpSpPr>
-          <p:cNvPr id="6" name="Group 6"/>
+          <p:cNvPr name="Group 6" id="6"/>
           <p:cNvGrpSpPr/>
           <p:nvPr/>
         </p:nvGrpSpPr>
         <p:grpSpPr>
-          <a:xfrm>
+          <a:xfrm rot="0">
             <a:off x="1028700" y="3716656"/>
             <a:ext cx="5541666" cy="5541644"/>
             <a:chOff x="0" y="0"/>
@@ -4356,12 +4203,12 @@
         </p:grpSpPr>
         <p:sp>
           <p:nvSpPr>
-            <p:cNvPr id="7" name="Freeform 7"/>
+            <p:cNvPr name="Freeform 7" id="7"/>
             <p:cNvSpPr/>
             <p:nvPr/>
           </p:nvSpPr>
           <p:spPr>
-            <a:xfrm>
+            <a:xfrm flipH="false" flipV="false" rot="0">
               <a:off x="0" y="0"/>
               <a:ext cx="6350000" cy="6349975"/>
             </a:xfrm>
@@ -4370,9 +4217,9 @@
               <a:gdLst/>
               <a:ahLst/>
               <a:cxnLst/>
-              <a:rect l="l" t="t" r="r" b="b"/>
+              <a:rect r="r" b="b" t="t" l="l"/>
               <a:pathLst>
-                <a:path w="6350000" h="6349975">
+                <a:path h="6349975" w="6350000">
                   <a:moveTo>
                     <a:pt x="6350000" y="3175025"/>
                   </a:moveTo>
@@ -4403,7 +4250,7 @@
             <a:blipFill>
               <a:blip r:embed="rId2"/>
               <a:stretch>
-                <a:fillRect/>
+                <a:fillRect l="0" t="0" r="0" b="0"/>
               </a:stretch>
             </a:blipFill>
           </p:spPr>
@@ -4411,12 +4258,12 @@
       </p:grpSp>
       <p:sp>
         <p:nvSpPr>
-          <p:cNvPr id="8" name="Freeform 8"/>
+          <p:cNvPr name="Freeform 8" id="8"/>
           <p:cNvSpPr/>
           <p:nvPr/>
         </p:nvSpPr>
         <p:spPr>
-          <a:xfrm>
+          <a:xfrm flipH="false" flipV="false" rot="0">
             <a:off x="13002824" y="2685947"/>
             <a:ext cx="3060015" cy="6625952"/>
           </a:xfrm>
@@ -4425,9 +4272,9 @@
             <a:gdLst/>
             <a:ahLst/>
             <a:cxnLst/>
-            <a:rect l="l" t="t" r="r" b="b"/>
+            <a:rect r="r" b="b" t="t" l="l"/>
             <a:pathLst>
-              <a:path w="3060015" h="6625952">
+              <a:path h="6625952" w="3060015">
                 <a:moveTo>
                   <a:pt x="0" y="0"/>
                 </a:moveTo>
@@ -4450,19 +4297,19 @@
           <a:blipFill>
             <a:blip r:embed="rId3"/>
             <a:stretch>
-              <a:fillRect/>
+              <a:fillRect l="0" t="0" r="0" b="0"/>
             </a:stretch>
           </a:blipFill>
         </p:spPr>
       </p:sp>
       <p:sp>
         <p:nvSpPr>
-          <p:cNvPr id="9" name="Freeform 9"/>
+          <p:cNvPr name="Freeform 9" id="9"/>
           <p:cNvSpPr/>
           <p:nvPr/>
         </p:nvSpPr>
         <p:spPr>
-          <a:xfrm>
+          <a:xfrm flipH="false" flipV="false" rot="0">
             <a:off x="9822542" y="1972726"/>
             <a:ext cx="3442267" cy="7453655"/>
           </a:xfrm>
@@ -4471,9 +4318,9 @@
             <a:gdLst/>
             <a:ahLst/>
             <a:cxnLst/>
-            <a:rect l="l" t="t" r="r" b="b"/>
+            <a:rect r="r" b="b" t="t" l="l"/>
             <a:pathLst>
-              <a:path w="3442267" h="7453655">
+              <a:path h="7453655" w="3442267">
                 <a:moveTo>
                   <a:pt x="0" y="0"/>
                 </a:moveTo>
@@ -4496,42 +4343,45 @@
           <a:blipFill>
             <a:blip r:embed="rId4"/>
             <a:stretch>
-              <a:fillRect/>
+              <a:fillRect l="0" t="0" r="0" b="0"/>
             </a:stretch>
           </a:blipFill>
         </p:spPr>
       </p:sp>
       <p:sp>
         <p:nvSpPr>
-          <p:cNvPr id="10" name="TextBox 10"/>
-          <p:cNvSpPr txBox="1"/>
+          <p:cNvPr name="TextBox 10" id="10"/>
+          <p:cNvSpPr txBox="true"/>
           <p:nvPr/>
         </p:nvSpPr>
         <p:spPr>
-          <a:xfrm>
-            <a:off x="9144000" y="568007"/>
-            <a:ext cx="8763000" cy="662233"/>
+          <a:xfrm rot="0">
+            <a:off x="8578509" y="423503"/>
+            <a:ext cx="9372599" cy="1124669"/>
           </a:xfrm>
           <a:prstGeom prst="rect">
             <a:avLst/>
           </a:prstGeom>
         </p:spPr>
         <p:txBody>
-          <a:bodyPr wrap="square" lIns="0" tIns="0" rIns="0" bIns="0" rtlCol="0" anchor="t">
+          <a:bodyPr anchor="t" rtlCol="false" tIns="0" lIns="0" bIns="0" rIns="0">
             <a:spAutoFit/>
           </a:bodyPr>
           <a:lstStyle/>
           <a:p>
             <a:pPr>
               <a:lnSpc>
-                <a:spcPts val="6439"/>
+                <a:spcPts val="4453"/>
               </a:lnSpc>
             </a:pPr>
             <a:r>
-              <a:rPr lang="en-US" sz="1600" u="sng" dirty="0">
+              <a:rPr lang="en-US" sz="3180">
+                <a:solidFill>
+                  <a:srgbClr val="000000"/>
+                </a:solidFill>
                 <a:latin typeface="Arimo"/>
               </a:rPr>
-              <a:t>https://www.figma.com/proto/1I0er8lO7XW10au6WJ9EI0?node-id=0-1&amp;t=X55FHdXTU9cFTs3Q-6</a:t>
+              <a:t>https://www.figma.com/proto/1I0er8lO7XW10au6WJ9EI0?node-id=0-1&amp;t=hJg0yQxJ32pUVr72-6</a:t>
             </a:r>
           </a:p>
         </p:txBody>
@@ -4545,7 +4395,7 @@
 </file>
 
 <file path=ppt/slides/slide4.xml><?xml version="1.0" encoding="utf-8"?>
-<p:sld xmlns:a="http://schemas.openxmlformats.org/drawingml/2006/main" xmlns:r="http://schemas.openxmlformats.org/officeDocument/2006/relationships" xmlns:p="http://schemas.openxmlformats.org/presentationml/2006/main">
+<p:sld xmlns:p="http://schemas.openxmlformats.org/presentationml/2006/main" xmlns:a="http://schemas.openxmlformats.org/drawingml/2006/main">
   <p:cSld>
     <p:spTree>
       <p:nvGrpSpPr>
@@ -4563,12 +4413,12 @@
       </p:grpSpPr>
       <p:grpSp>
         <p:nvGrpSpPr>
-          <p:cNvPr id="2" name="Group 2"/>
+          <p:cNvPr name="Group 2" id="2"/>
           <p:cNvGrpSpPr/>
           <p:nvPr/>
         </p:nvGrpSpPr>
         <p:grpSpPr>
-          <a:xfrm>
+          <a:xfrm rot="0">
             <a:off x="2945984" y="-8852732"/>
             <a:ext cx="12396032" cy="12396032"/>
             <a:chOff x="0" y="0"/>
@@ -4577,12 +4427,12 @@
         </p:grpSpPr>
         <p:sp>
           <p:nvSpPr>
-            <p:cNvPr id="3" name="Freeform 3"/>
+            <p:cNvPr name="Freeform 3" id="3"/>
             <p:cNvSpPr/>
             <p:nvPr/>
           </p:nvSpPr>
           <p:spPr>
-            <a:xfrm>
+            <a:xfrm flipH="false" flipV="false" rot="0">
               <a:off x="0" y="0"/>
               <a:ext cx="6350000" cy="6350000"/>
             </a:xfrm>
@@ -4591,9 +4441,9 @@
               <a:gdLst/>
               <a:ahLst/>
               <a:cxnLst/>
-              <a:rect l="l" t="t" r="r" b="b"/>
+              <a:rect r="r" b="b" t="t" l="l"/>
               <a:pathLst>
-                <a:path w="6350000" h="6350000">
+                <a:path h="6350000" w="6350000">
                   <a:moveTo>
                     <a:pt x="3175000" y="0"/>
                   </a:moveTo>
@@ -4629,60 +4479,60 @@
       </p:grpSp>
       <p:sp>
         <p:nvSpPr>
-          <p:cNvPr id="4" name="AutoShape 4"/>
+          <p:cNvPr name="AutoShape 4" id="4"/>
           <p:cNvSpPr/>
           <p:nvPr/>
         </p:nvSpPr>
         <p:spPr>
-          <a:xfrm flipV="1">
+          <a:xfrm flipV="true">
             <a:off x="6274416" y="6584578"/>
             <a:ext cx="0" cy="2673722"/>
           </a:xfrm>
           <a:prstGeom prst="line">
             <a:avLst/>
           </a:prstGeom>
-          <a:ln w="9525" cap="flat">
+          <a:ln cap="flat" w="9525">
             <a:solidFill>
               <a:srgbClr val="000000"/>
             </a:solidFill>
             <a:prstDash val="solid"/>
-            <a:headEnd type="none" w="sm" len="sm"/>
-            <a:tailEnd type="none" w="sm" len="sm"/>
+            <a:headEnd type="none" len="sm" w="sm"/>
+            <a:tailEnd type="none" len="sm" w="sm"/>
           </a:ln>
         </p:spPr>
       </p:sp>
       <p:sp>
         <p:nvSpPr>
-          <p:cNvPr id="5" name="AutoShape 5"/>
+          <p:cNvPr name="AutoShape 5" id="5"/>
           <p:cNvSpPr/>
           <p:nvPr/>
         </p:nvSpPr>
         <p:spPr>
-          <a:xfrm flipV="1">
+          <a:xfrm flipV="true">
             <a:off x="12013584" y="6584578"/>
             <a:ext cx="0" cy="2673722"/>
           </a:xfrm>
           <a:prstGeom prst="line">
             <a:avLst/>
           </a:prstGeom>
-          <a:ln w="9525" cap="flat">
+          <a:ln cap="flat" w="9525">
             <a:solidFill>
               <a:srgbClr val="000000"/>
             </a:solidFill>
             <a:prstDash val="solid"/>
-            <a:headEnd type="none" w="sm" len="sm"/>
-            <a:tailEnd type="none" w="sm" len="sm"/>
+            <a:headEnd type="none" len="sm" w="sm"/>
+            <a:tailEnd type="none" len="sm" w="sm"/>
           </a:ln>
         </p:spPr>
       </p:sp>
       <p:sp>
         <p:nvSpPr>
-          <p:cNvPr id="6" name="TextBox 6"/>
-          <p:cNvSpPr txBox="1"/>
+          <p:cNvPr name="TextBox 6" id="6"/>
+          <p:cNvSpPr txBox="true"/>
           <p:nvPr/>
         </p:nvSpPr>
         <p:spPr>
-          <a:xfrm>
+          <a:xfrm rot="0">
             <a:off x="5647162" y="471475"/>
             <a:ext cx="6993677" cy="1968612"/>
           </a:xfrm>
@@ -4691,12 +4541,12 @@
           </a:prstGeom>
         </p:spPr>
         <p:txBody>
-          <a:bodyPr lIns="0" tIns="0" rIns="0" bIns="0" rtlCol="0" anchor="t">
+          <a:bodyPr anchor="t" rtlCol="false" tIns="0" lIns="0" bIns="0" rIns="0">
             <a:spAutoFit/>
           </a:bodyPr>
           <a:lstStyle/>
           <a:p>
-            <a:pPr marL="0" lvl="0" indent="0" algn="ctr">
+            <a:pPr algn="ctr" marL="0" indent="0" lvl="0">
               <a:lnSpc>
                 <a:spcPts val="7820"/>
               </a:lnSpc>
@@ -4715,12 +4565,12 @@
       </p:sp>
       <p:grpSp>
         <p:nvGrpSpPr>
-          <p:cNvPr id="7" name="Group 7"/>
+          <p:cNvPr name="Group 7" id="7"/>
           <p:cNvGrpSpPr/>
           <p:nvPr/>
         </p:nvGrpSpPr>
         <p:grpSpPr>
-          <a:xfrm>
+          <a:xfrm rot="0">
             <a:off x="1022089" y="7077736"/>
             <a:ext cx="4752265" cy="1641686"/>
             <a:chOff x="0" y="0"/>
@@ -4729,12 +4579,12 @@
         </p:grpSpPr>
         <p:sp>
           <p:nvSpPr>
-            <p:cNvPr id="8" name="TextBox 8"/>
-            <p:cNvSpPr txBox="1"/>
+            <p:cNvPr name="TextBox 8" id="8"/>
+            <p:cNvSpPr txBox="true"/>
             <p:nvPr/>
           </p:nvSpPr>
           <p:spPr>
-            <a:xfrm>
+            <a:xfrm rot="0">
               <a:off x="0" y="898807"/>
               <a:ext cx="6336353" cy="1290108"/>
             </a:xfrm>
@@ -4743,7 +4593,7 @@
             </a:prstGeom>
           </p:spPr>
           <p:txBody>
-            <a:bodyPr lIns="0" tIns="0" rIns="0" bIns="0" rtlCol="0" anchor="t">
+            <a:bodyPr anchor="t" rtlCol="false" tIns="0" lIns="0" bIns="0" rIns="0">
               <a:spAutoFit/>
             </a:bodyPr>
             <a:lstStyle/>
@@ -4767,12 +4617,12 @@
         </p:sp>
         <p:sp>
           <p:nvSpPr>
-            <p:cNvPr id="9" name="TextBox 9"/>
-            <p:cNvSpPr txBox="1"/>
+            <p:cNvPr name="TextBox 9" id="9"/>
+            <p:cNvSpPr txBox="true"/>
             <p:nvPr/>
           </p:nvSpPr>
           <p:spPr>
-            <a:xfrm>
+            <a:xfrm rot="0">
               <a:off x="0" y="-9525"/>
               <a:ext cx="6336353" cy="536998"/>
             </a:xfrm>
@@ -4781,7 +4631,7 @@
             </a:prstGeom>
           </p:spPr>
           <p:txBody>
-            <a:bodyPr lIns="0" tIns="0" rIns="0" bIns="0" rtlCol="0" anchor="t">
+            <a:bodyPr anchor="t" rtlCol="false" tIns="0" lIns="0" bIns="0" rIns="0">
               <a:spAutoFit/>
             </a:bodyPr>
             <a:lstStyle/>
@@ -4806,12 +4656,12 @@
       </p:grpSp>
       <p:grpSp>
         <p:nvGrpSpPr>
-          <p:cNvPr id="10" name="Group 10"/>
+          <p:cNvPr name="Group 10" id="10"/>
           <p:cNvGrpSpPr/>
           <p:nvPr/>
         </p:nvGrpSpPr>
         <p:grpSpPr>
-          <a:xfrm>
+          <a:xfrm rot="0">
             <a:off x="6764954" y="7077736"/>
             <a:ext cx="4752265" cy="1641686"/>
             <a:chOff x="0" y="0"/>
@@ -4820,12 +4670,12 @@
         </p:grpSpPr>
         <p:sp>
           <p:nvSpPr>
-            <p:cNvPr id="11" name="TextBox 11"/>
-            <p:cNvSpPr txBox="1"/>
+            <p:cNvPr name="TextBox 11" id="11"/>
+            <p:cNvSpPr txBox="true"/>
             <p:nvPr/>
           </p:nvSpPr>
           <p:spPr>
-            <a:xfrm>
+            <a:xfrm rot="0">
               <a:off x="0" y="898807"/>
               <a:ext cx="6336353" cy="1290108"/>
             </a:xfrm>
@@ -4834,7 +4684,7 @@
             </a:prstGeom>
           </p:spPr>
           <p:txBody>
-            <a:bodyPr lIns="0" tIns="0" rIns="0" bIns="0" rtlCol="0" anchor="t">
+            <a:bodyPr anchor="t" rtlCol="false" tIns="0" lIns="0" bIns="0" rIns="0">
               <a:spAutoFit/>
             </a:bodyPr>
             <a:lstStyle/>
@@ -4858,12 +4708,12 @@
         </p:sp>
         <p:sp>
           <p:nvSpPr>
-            <p:cNvPr id="12" name="TextBox 12"/>
-            <p:cNvSpPr txBox="1"/>
+            <p:cNvPr name="TextBox 12" id="12"/>
+            <p:cNvSpPr txBox="true"/>
             <p:nvPr/>
           </p:nvSpPr>
           <p:spPr>
-            <a:xfrm>
+            <a:xfrm rot="0">
               <a:off x="0" y="-9525"/>
               <a:ext cx="6336353" cy="536998"/>
             </a:xfrm>
@@ -4872,7 +4722,7 @@
             </a:prstGeom>
           </p:spPr>
           <p:txBody>
-            <a:bodyPr lIns="0" tIns="0" rIns="0" bIns="0" rtlCol="0" anchor="t">
+            <a:bodyPr anchor="t" rtlCol="false" tIns="0" lIns="0" bIns="0" rIns="0">
               <a:spAutoFit/>
             </a:bodyPr>
             <a:lstStyle/>
@@ -4897,12 +4747,12 @@
       </p:grpSp>
       <p:grpSp>
         <p:nvGrpSpPr>
-          <p:cNvPr id="13" name="Group 13"/>
+          <p:cNvPr name="Group 13" id="13"/>
           <p:cNvGrpSpPr/>
           <p:nvPr/>
         </p:nvGrpSpPr>
         <p:grpSpPr>
-          <a:xfrm>
+          <a:xfrm rot="0">
             <a:off x="12513646" y="7077736"/>
             <a:ext cx="4752265" cy="1641686"/>
             <a:chOff x="0" y="0"/>
@@ -4911,12 +4761,12 @@
         </p:grpSpPr>
         <p:sp>
           <p:nvSpPr>
-            <p:cNvPr id="14" name="TextBox 14"/>
-            <p:cNvSpPr txBox="1"/>
+            <p:cNvPr name="TextBox 14" id="14"/>
+            <p:cNvSpPr txBox="true"/>
             <p:nvPr/>
           </p:nvSpPr>
           <p:spPr>
-            <a:xfrm>
+            <a:xfrm rot="0">
               <a:off x="0" y="898807"/>
               <a:ext cx="6336353" cy="1290108"/>
             </a:xfrm>
@@ -4925,7 +4775,7 @@
             </a:prstGeom>
           </p:spPr>
           <p:txBody>
-            <a:bodyPr lIns="0" tIns="0" rIns="0" bIns="0" rtlCol="0" anchor="t">
+            <a:bodyPr anchor="t" rtlCol="false" tIns="0" lIns="0" bIns="0" rIns="0">
               <a:spAutoFit/>
             </a:bodyPr>
             <a:lstStyle/>
@@ -4949,12 +4799,12 @@
         </p:sp>
         <p:sp>
           <p:nvSpPr>
-            <p:cNvPr id="15" name="TextBox 15"/>
-            <p:cNvSpPr txBox="1"/>
+            <p:cNvPr name="TextBox 15" id="15"/>
+            <p:cNvSpPr txBox="true"/>
             <p:nvPr/>
           </p:nvSpPr>
           <p:spPr>
-            <a:xfrm>
+            <a:xfrm rot="0">
               <a:off x="0" y="-9525"/>
               <a:ext cx="6336353" cy="536998"/>
             </a:xfrm>
@@ -4963,7 +4813,7 @@
             </a:prstGeom>
           </p:spPr>
           <p:txBody>
-            <a:bodyPr lIns="0" tIns="0" rIns="0" bIns="0" rtlCol="0" anchor="t">
+            <a:bodyPr anchor="t" rtlCol="false" tIns="0" lIns="0" bIns="0" rIns="0">
               <a:spAutoFit/>
             </a:bodyPr>
             <a:lstStyle/>
@@ -4988,12 +4838,12 @@
       </p:grpSp>
       <p:sp>
         <p:nvSpPr>
-          <p:cNvPr id="16" name="TextBox 16"/>
-          <p:cNvSpPr txBox="1"/>
+          <p:cNvPr name="TextBox 16" id="16"/>
+          <p:cNvSpPr txBox="true"/>
           <p:nvPr/>
         </p:nvSpPr>
         <p:spPr>
-          <a:xfrm>
+          <a:xfrm rot="0">
             <a:off x="6896416" y="4624387"/>
             <a:ext cx="4495168" cy="1047750"/>
           </a:xfrm>
@@ -5002,12 +4852,12 @@
           </a:prstGeom>
         </p:spPr>
         <p:txBody>
-          <a:bodyPr lIns="0" tIns="0" rIns="0" bIns="0" rtlCol="0" anchor="t">
+          <a:bodyPr anchor="t" rtlCol="false" tIns="0" lIns="0" bIns="0" rIns="0">
             <a:spAutoFit/>
           </a:bodyPr>
           <a:lstStyle/>
           <a:p>
-            <a:pPr marL="0" lvl="0" indent="0" algn="ctr">
+            <a:pPr algn="ctr" marL="0" indent="0" lvl="0">
               <a:lnSpc>
                 <a:spcPts val="8399"/>
               </a:lnSpc>
@@ -5033,7 +4883,7 @@
 </file>
 
 <file path=ppt/slides/slide5.xml><?xml version="1.0" encoding="utf-8"?>
-<p:sld xmlns:a="http://schemas.openxmlformats.org/drawingml/2006/main" xmlns:r="http://schemas.openxmlformats.org/officeDocument/2006/relationships" xmlns:p="http://schemas.openxmlformats.org/presentationml/2006/main">
+<p:sld xmlns:p="http://schemas.openxmlformats.org/presentationml/2006/main" xmlns:a="http://schemas.openxmlformats.org/drawingml/2006/main">
   <p:cSld>
     <p:spTree>
       <p:nvGrpSpPr>
@@ -5051,7 +4901,7 @@
       </p:grpSpPr>
       <p:grpSp>
         <p:nvGrpSpPr>
-          <p:cNvPr id="2" name="Group 2"/>
+          <p:cNvPr name="Group 2" id="2"/>
           <p:cNvGrpSpPr/>
           <p:nvPr/>
         </p:nvGrpSpPr>
@@ -5065,12 +4915,12 @@
         </p:grpSpPr>
         <p:sp>
           <p:nvSpPr>
-            <p:cNvPr id="3" name="Freeform 3"/>
+            <p:cNvPr name="Freeform 3" id="3"/>
             <p:cNvSpPr/>
             <p:nvPr/>
           </p:nvSpPr>
           <p:spPr>
-            <a:xfrm>
+            <a:xfrm flipH="false" flipV="false" rot="0">
               <a:off x="19050" y="19050"/>
               <a:ext cx="4022947" cy="2195449"/>
             </a:xfrm>
@@ -5079,9 +4929,9 @@
               <a:gdLst/>
               <a:ahLst/>
               <a:cxnLst/>
-              <a:rect l="l" t="t" r="r" b="b"/>
+              <a:rect r="r" b="b" t="t" l="l"/>
               <a:pathLst>
-                <a:path w="4022947" h="2195449">
+                <a:path h="2195449" w="4022947">
                   <a:moveTo>
                     <a:pt x="2925031" y="2195449"/>
                   </a:moveTo>
@@ -5122,12 +4972,12 @@
         </p:sp>
         <p:sp>
           <p:nvSpPr>
-            <p:cNvPr id="4" name="Freeform 4"/>
+            <p:cNvPr name="Freeform 4" id="4"/>
             <p:cNvSpPr/>
             <p:nvPr/>
           </p:nvSpPr>
           <p:spPr>
-            <a:xfrm>
+            <a:xfrm flipH="false" flipV="false" rot="0">
               <a:off x="0" y="0"/>
               <a:ext cx="4060920" cy="2233549"/>
             </a:xfrm>
@@ -5136,9 +4986,9 @@
               <a:gdLst/>
               <a:ahLst/>
               <a:cxnLst/>
-              <a:rect l="l" t="t" r="r" b="b"/>
+              <a:rect r="r" b="b" t="t" l="l"/>
               <a:pathLst>
-                <a:path w="4060920" h="2233549">
+                <a:path h="2233549" w="4060920">
                   <a:moveTo>
                     <a:pt x="2944081" y="2233549"/>
                   </a:moveTo>
@@ -5210,7 +5060,7 @@
       </p:grpSp>
       <p:grpSp>
         <p:nvGrpSpPr>
-          <p:cNvPr id="5" name="Group 5"/>
+          <p:cNvPr name="Group 5" id="5"/>
           <p:cNvGrpSpPr/>
           <p:nvPr/>
         </p:nvGrpSpPr>
@@ -5224,12 +5074,12 @@
         </p:grpSpPr>
         <p:sp>
           <p:nvSpPr>
-            <p:cNvPr id="6" name="Freeform 6"/>
+            <p:cNvPr name="Freeform 6" id="6"/>
             <p:cNvSpPr/>
             <p:nvPr/>
           </p:nvSpPr>
           <p:spPr>
-            <a:xfrm>
+            <a:xfrm flipH="false" flipV="false" rot="0">
               <a:off x="19050" y="19050"/>
               <a:ext cx="4022947" cy="2195449"/>
             </a:xfrm>
@@ -5238,9 +5088,9 @@
               <a:gdLst/>
               <a:ahLst/>
               <a:cxnLst/>
-              <a:rect l="l" t="t" r="r" b="b"/>
+              <a:rect r="r" b="b" t="t" l="l"/>
               <a:pathLst>
-                <a:path w="4022947" h="2195449">
+                <a:path h="2195449" w="4022947">
                   <a:moveTo>
                     <a:pt x="2925031" y="2195449"/>
                   </a:moveTo>
@@ -5281,12 +5131,12 @@
         </p:sp>
         <p:sp>
           <p:nvSpPr>
-            <p:cNvPr id="7" name="Freeform 7"/>
+            <p:cNvPr name="Freeform 7" id="7"/>
             <p:cNvSpPr/>
             <p:nvPr/>
           </p:nvSpPr>
           <p:spPr>
-            <a:xfrm>
+            <a:xfrm flipH="false" flipV="false" rot="0">
               <a:off x="0" y="0"/>
               <a:ext cx="4060920" cy="2233549"/>
             </a:xfrm>
@@ -5295,9 +5145,9 @@
               <a:gdLst/>
               <a:ahLst/>
               <a:cxnLst/>
-              <a:rect l="l" t="t" r="r" b="b"/>
+              <a:rect r="r" b="b" t="t" l="l"/>
               <a:pathLst>
-                <a:path w="4060920" h="2233549">
+                <a:path h="2233549" w="4060920">
                   <a:moveTo>
                     <a:pt x="2944081" y="2233549"/>
                   </a:moveTo>
@@ -5369,12 +5219,12 @@
       </p:grpSp>
       <p:sp>
         <p:nvSpPr>
-          <p:cNvPr id="8" name="TextBox 8"/>
-          <p:cNvSpPr txBox="1"/>
+          <p:cNvPr name="TextBox 8" id="8"/>
+          <p:cNvSpPr txBox="true"/>
           <p:nvPr/>
         </p:nvSpPr>
         <p:spPr>
-          <a:xfrm>
+          <a:xfrm rot="0">
             <a:off x="1924623" y="1038225"/>
             <a:ext cx="14438754" cy="1047651"/>
           </a:xfrm>
@@ -5383,12 +5233,12 @@
           </a:prstGeom>
         </p:spPr>
         <p:txBody>
-          <a:bodyPr lIns="0" tIns="0" rIns="0" bIns="0" rtlCol="0" anchor="t">
+          <a:bodyPr anchor="t" rtlCol="false" tIns="0" lIns="0" bIns="0" rIns="0">
             <a:spAutoFit/>
           </a:bodyPr>
           <a:lstStyle/>
           <a:p>
-            <a:pPr marL="0" lvl="0" indent="0" algn="ctr">
+            <a:pPr algn="ctr" marL="0" indent="0" lvl="0">
               <a:lnSpc>
                 <a:spcPts val="8399"/>
               </a:lnSpc>
@@ -5407,12 +5257,12 @@
       </p:sp>
       <p:sp>
         <p:nvSpPr>
-          <p:cNvPr id="9" name="TextBox 9"/>
-          <p:cNvSpPr txBox="1"/>
+          <p:cNvPr name="TextBox 9" id="9"/>
+          <p:cNvSpPr txBox="true"/>
           <p:nvPr/>
         </p:nvSpPr>
         <p:spPr>
-          <a:xfrm>
+          <a:xfrm rot="0">
             <a:off x="13087891" y="6348682"/>
             <a:ext cx="3752083" cy="405130"/>
           </a:xfrm>
@@ -5421,7 +5271,7 @@
           </a:prstGeom>
         </p:spPr>
         <p:txBody>
-          <a:bodyPr lIns="0" tIns="0" rIns="0" bIns="0" rtlCol="0" anchor="t">
+          <a:bodyPr anchor="t" rtlCol="false" tIns="0" lIns="0" bIns="0" rIns="0">
             <a:spAutoFit/>
           </a:bodyPr>
           <a:lstStyle/>
@@ -5445,7 +5295,7 @@
       </p:sp>
       <p:grpSp>
         <p:nvGrpSpPr>
-          <p:cNvPr id="10" name="Group 10"/>
+          <p:cNvPr name="Group 10" id="10"/>
           <p:cNvGrpSpPr/>
           <p:nvPr/>
         </p:nvGrpSpPr>
@@ -5459,12 +5309,12 @@
         </p:grpSpPr>
         <p:sp>
           <p:nvSpPr>
-            <p:cNvPr id="11" name="Freeform 11"/>
+            <p:cNvPr name="Freeform 11" id="11"/>
             <p:cNvSpPr/>
             <p:nvPr/>
           </p:nvSpPr>
           <p:spPr>
-            <a:xfrm>
+            <a:xfrm flipH="false" flipV="false" rot="0">
               <a:off x="19050" y="19050"/>
               <a:ext cx="4022947" cy="2195449"/>
             </a:xfrm>
@@ -5473,9 +5323,9 @@
               <a:gdLst/>
               <a:ahLst/>
               <a:cxnLst/>
-              <a:rect l="l" t="t" r="r" b="b"/>
+              <a:rect r="r" b="b" t="t" l="l"/>
               <a:pathLst>
-                <a:path w="4022947" h="2195449">
+                <a:path h="2195449" w="4022947">
                   <a:moveTo>
                     <a:pt x="2925031" y="2195449"/>
                   </a:moveTo>
@@ -5516,12 +5366,12 @@
         </p:sp>
         <p:sp>
           <p:nvSpPr>
-            <p:cNvPr id="12" name="Freeform 12"/>
+            <p:cNvPr name="Freeform 12" id="12"/>
             <p:cNvSpPr/>
             <p:nvPr/>
           </p:nvSpPr>
           <p:spPr>
-            <a:xfrm>
+            <a:xfrm flipH="false" flipV="false" rot="0">
               <a:off x="0" y="0"/>
               <a:ext cx="4060920" cy="2233549"/>
             </a:xfrm>
@@ -5530,9 +5380,9 @@
               <a:gdLst/>
               <a:ahLst/>
               <a:cxnLst/>
-              <a:rect l="l" t="t" r="r" b="b"/>
+              <a:rect r="r" b="b" t="t" l="l"/>
               <a:pathLst>
-                <a:path w="4060920" h="2233549">
+                <a:path h="2233549" w="4060920">
                   <a:moveTo>
                     <a:pt x="2944081" y="2233549"/>
                   </a:moveTo>
@@ -5604,12 +5454,12 @@
       </p:grpSp>
       <p:sp>
         <p:nvSpPr>
-          <p:cNvPr id="13" name="AutoShape 13"/>
+          <p:cNvPr name="AutoShape 13" id="13"/>
           <p:cNvSpPr/>
           <p:nvPr/>
         </p:nvSpPr>
         <p:spPr>
-          <a:xfrm>
+          <a:xfrm rot="0">
             <a:off x="0" y="8692169"/>
             <a:ext cx="18288000" cy="1594831"/>
           </a:xfrm>
@@ -5623,12 +5473,12 @@
       </p:sp>
       <p:sp>
         <p:nvSpPr>
-          <p:cNvPr id="14" name="TextBox 14"/>
-          <p:cNvSpPr txBox="1"/>
+          <p:cNvPr name="TextBox 14" id="14"/>
+          <p:cNvSpPr txBox="true"/>
           <p:nvPr/>
         </p:nvSpPr>
         <p:spPr>
-          <a:xfrm>
+          <a:xfrm rot="0">
             <a:off x="1261909" y="2496930"/>
             <a:ext cx="15997391" cy="1559625"/>
           </a:xfrm>
@@ -5637,7 +5487,7 @@
           </a:prstGeom>
         </p:spPr>
         <p:txBody>
-          <a:bodyPr lIns="0" tIns="0" rIns="0" bIns="0" rtlCol="0" anchor="t">
+          <a:bodyPr anchor="t" rtlCol="false" tIns="0" lIns="0" bIns="0" rIns="0">
             <a:spAutoFit/>
           </a:bodyPr>
           <a:lstStyle/>
@@ -5661,12 +5511,12 @@
       </p:sp>
       <p:sp>
         <p:nvSpPr>
-          <p:cNvPr id="15" name="TextBox 15"/>
-          <p:cNvSpPr txBox="1"/>
+          <p:cNvPr name="TextBox 15" id="15"/>
+          <p:cNvSpPr txBox="true"/>
           <p:nvPr/>
         </p:nvSpPr>
         <p:spPr>
-          <a:xfrm>
+          <a:xfrm rot="0">
             <a:off x="1455003" y="6348682"/>
             <a:ext cx="3752083" cy="405130"/>
           </a:xfrm>
@@ -5675,7 +5525,7 @@
           </a:prstGeom>
         </p:spPr>
         <p:txBody>
-          <a:bodyPr lIns="0" tIns="0" rIns="0" bIns="0" rtlCol="0" anchor="t">
+          <a:bodyPr anchor="t" rtlCol="false" tIns="0" lIns="0" bIns="0" rIns="0">
             <a:spAutoFit/>
           </a:bodyPr>
           <a:lstStyle/>
@@ -5699,12 +5549,12 @@
       </p:sp>
       <p:sp>
         <p:nvSpPr>
-          <p:cNvPr id="16" name="TextBox 16"/>
-          <p:cNvSpPr txBox="1"/>
+          <p:cNvPr name="TextBox 16" id="16"/>
+          <p:cNvSpPr txBox="true"/>
           <p:nvPr/>
         </p:nvSpPr>
         <p:spPr>
-          <a:xfrm>
+          <a:xfrm rot="0">
             <a:off x="7384563" y="6348682"/>
             <a:ext cx="3752083" cy="405130"/>
           </a:xfrm>
@@ -5713,7 +5563,7 @@
           </a:prstGeom>
         </p:spPr>
         <p:txBody>
-          <a:bodyPr lIns="0" tIns="0" rIns="0" bIns="0" rtlCol="0" anchor="t">
+          <a:bodyPr anchor="t" rtlCol="false" tIns="0" lIns="0" bIns="0" rIns="0">
             <a:spAutoFit/>
           </a:bodyPr>
           <a:lstStyle/>
@@ -5744,7 +5594,7 @@
 </file>
 
 <file path=ppt/slides/slide6.xml><?xml version="1.0" encoding="utf-8"?>
-<p:sld xmlns:a="http://schemas.openxmlformats.org/drawingml/2006/main" xmlns:r="http://schemas.openxmlformats.org/officeDocument/2006/relationships" xmlns:p="http://schemas.openxmlformats.org/presentationml/2006/main">
+<p:sld xmlns:p="http://schemas.openxmlformats.org/presentationml/2006/main" xmlns:a="http://schemas.openxmlformats.org/drawingml/2006/main" xmlns:r="http://schemas.openxmlformats.org/officeDocument/2006/relationships">
   <p:cSld>
     <p:spTree>
       <p:nvGrpSpPr>
@@ -5762,12 +5612,12 @@
       </p:grpSpPr>
       <p:sp>
         <p:nvSpPr>
-          <p:cNvPr id="2" name="Freeform 2"/>
+          <p:cNvPr name="Freeform 2" id="2"/>
           <p:cNvSpPr/>
           <p:nvPr/>
         </p:nvSpPr>
         <p:spPr>
-          <a:xfrm>
+          <a:xfrm flipH="false" flipV="false" rot="0">
             <a:off x="10671898" y="6145754"/>
             <a:ext cx="10471590" cy="5235795"/>
           </a:xfrm>
@@ -5776,9 +5626,9 @@
             <a:gdLst/>
             <a:ahLst/>
             <a:cxnLst/>
-            <a:rect l="l" t="t" r="r" b="b"/>
+            <a:rect r="r" b="b" t="t" l="l"/>
             <a:pathLst>
-              <a:path w="10471590" h="5235795">
+              <a:path h="5235795" w="10471590">
                 <a:moveTo>
                   <a:pt x="0" y="0"/>
                 </a:moveTo>
@@ -5807,47 +5657,35 @@
               </a:extLst>
             </a:blip>
             <a:stretch>
-              <a:fillRect/>
+              <a:fillRect l="0" t="0" r="0" b="0"/>
             </a:stretch>
           </a:blipFill>
         </p:spPr>
       </p:sp>
       <p:graphicFrame>
         <p:nvGraphicFramePr>
-          <p:cNvPr id="3" name="Table 3"/>
+          <p:cNvPr name="Table 3" id="3"/>
           <p:cNvGraphicFramePr>
-            <a:graphicFrameLocks noGrp="1"/>
+            <a:graphicFrameLocks noGrp="true"/>
           </p:cNvGraphicFramePr>
           <p:nvPr/>
         </p:nvGraphicFramePr>
         <p:xfrm>
           <a:off x="7707334" y="847725"/>
-          <a:ext cx="9542440" cy="5576688"/>
+          <a:ext cx="9542441" cy="5576689"/>
         </p:xfrm>
         <a:graphic>
           <a:graphicData uri="http://schemas.openxmlformats.org/drawingml/2006/table">
             <a:tbl>
               <a:tblPr/>
               <a:tblGrid>
-                <a:gridCol w="4771220">
-                  <a:extLst>
-                    <a:ext uri="{9D8B030D-6E8A-4147-A177-3AD203B41FA5}">
-                      <a16:colId xmlns:a16="http://schemas.microsoft.com/office/drawing/2014/main" val="20000"/>
-                    </a:ext>
-                  </a:extLst>
-                </a:gridCol>
-                <a:gridCol w="4771220">
-                  <a:extLst>
-                    <a:ext uri="{9D8B030D-6E8A-4147-A177-3AD203B41FA5}">
-                      <a16:colId xmlns:a16="http://schemas.microsoft.com/office/drawing/2014/main" val="20001"/>
-                    </a:ext>
-                  </a:extLst>
-                </a:gridCol>
+                <a:gridCol w="4771220"/>
+                <a:gridCol w="4771220"/>
               </a:tblGrid>
               <a:tr h="2799618">
                 <a:tc>
                   <a:txBody>
-                    <a:bodyPr/>
+                    <a:bodyPr anchor="t" rtlCol="false"/>
                     <a:lstStyle/>
                     <a:p>
                       <a:pPr algn="ctr">
@@ -5869,7 +5707,7 @@
                     </a:p>
                   </a:txBody>
                   <a:tcPr marL="190500" marR="190500" marT="190500" marB="190500" anchor="ctr">
-                    <a:lnL w="9525" cap="flat" cmpd="sng" algn="ctr">
+                    <a:lnL cmpd="sng" algn="ctr" cap="flat" w="9525">
                       <a:solidFill>
                         <a:srgbClr val="000000"/>
                       </a:solidFill>
@@ -5878,7 +5716,7 @@
                       <a:headEnd type="none" w="med" len="med"/>
                       <a:tailEnd type="none" w="med" len="med"/>
                     </a:lnL>
-                    <a:lnR w="9525" cap="flat" cmpd="sng" algn="ctr">
+                    <a:lnR cmpd="sng" algn="ctr" cap="flat" w="9525">
                       <a:solidFill>
                         <a:srgbClr val="000000"/>
                       </a:solidFill>
@@ -5887,7 +5725,7 @@
                       <a:headEnd type="none" w="med" len="med"/>
                       <a:tailEnd type="none" w="med" len="med"/>
                     </a:lnR>
-                    <a:lnT w="9525" cap="flat" cmpd="sng" algn="ctr">
+                    <a:lnT cmpd="sng" algn="ctr" cap="flat" w="9525">
                       <a:solidFill>
                         <a:srgbClr val="000000"/>
                       </a:solidFill>
@@ -5896,7 +5734,7 @@
                       <a:headEnd type="none" w="med" len="med"/>
                       <a:tailEnd type="none" w="med" len="med"/>
                     </a:lnT>
-                    <a:lnB w="9525" cap="flat" cmpd="sng" algn="ctr">
+                    <a:lnB cmpd="sng" algn="ctr" cap="flat" w="9525">
                       <a:solidFill>
                         <a:srgbClr val="000000"/>
                       </a:solidFill>
@@ -5912,7 +5750,7 @@
                 </a:tc>
                 <a:tc>
                   <a:txBody>
-                    <a:bodyPr/>
+                    <a:bodyPr anchor="t" rtlCol="false"/>
                     <a:lstStyle/>
                     <a:p>
                       <a:pPr algn="ctr">
@@ -5934,7 +5772,7 @@
                     </a:p>
                   </a:txBody>
                   <a:tcPr marL="190500" marR="190500" marT="190500" marB="190500" anchor="ctr">
-                    <a:lnL w="9525" cap="flat" cmpd="sng" algn="ctr">
+                    <a:lnL cmpd="sng" algn="ctr" cap="flat" w="9525">
                       <a:solidFill>
                         <a:srgbClr val="000000"/>
                       </a:solidFill>
@@ -5943,7 +5781,7 @@
                       <a:headEnd type="none" w="med" len="med"/>
                       <a:tailEnd type="none" w="med" len="med"/>
                     </a:lnL>
-                    <a:lnR w="9525" cap="flat" cmpd="sng" algn="ctr">
+                    <a:lnR cmpd="sng" algn="ctr" cap="flat" w="9525">
                       <a:solidFill>
                         <a:srgbClr val="000000"/>
                       </a:solidFill>
@@ -5952,7 +5790,7 @@
                       <a:headEnd type="none" w="med" len="med"/>
                       <a:tailEnd type="none" w="med" len="med"/>
                     </a:lnR>
-                    <a:lnT w="9525" cap="flat" cmpd="sng" algn="ctr">
+                    <a:lnT cmpd="sng" algn="ctr" cap="flat" w="9525">
                       <a:solidFill>
                         <a:srgbClr val="000000"/>
                       </a:solidFill>
@@ -5961,7 +5799,7 @@
                       <a:headEnd type="none" w="med" len="med"/>
                       <a:tailEnd type="none" w="med" len="med"/>
                     </a:lnT>
-                    <a:lnB w="9525" cap="flat" cmpd="sng" algn="ctr">
+                    <a:lnB cmpd="sng" algn="ctr" cap="flat" w="9525">
                       <a:solidFill>
                         <a:srgbClr val="000000"/>
                       </a:solidFill>
@@ -5975,16 +5813,11 @@
                     </a:solidFill>
                   </a:tcPr>
                 </a:tc>
-                <a:extLst>
-                  <a:ext uri="{0D108BD9-81ED-4DB2-BD59-A6C34878D82A}">
-                    <a16:rowId xmlns:a16="http://schemas.microsoft.com/office/drawing/2014/main" val="10000"/>
-                  </a:ext>
-                </a:extLst>
               </a:tr>
               <a:tr h="2777070">
                 <a:tc>
                   <a:txBody>
-                    <a:bodyPr/>
+                    <a:bodyPr anchor="t" rtlCol="false"/>
                     <a:lstStyle/>
                     <a:p>
                       <a:pPr algn="ctr">
@@ -6006,7 +5839,7 @@
                     </a:p>
                   </a:txBody>
                   <a:tcPr marL="190500" marR="190500" marT="190500" marB="190500" anchor="ctr">
-                    <a:lnL w="9525" cap="flat" cmpd="sng" algn="ctr">
+                    <a:lnL cmpd="sng" algn="ctr" cap="flat" w="9525">
                       <a:solidFill>
                         <a:srgbClr val="000000"/>
                       </a:solidFill>
@@ -6015,7 +5848,7 @@
                       <a:headEnd type="none" w="med" len="med"/>
                       <a:tailEnd type="none" w="med" len="med"/>
                     </a:lnL>
-                    <a:lnR w="9525" cap="flat" cmpd="sng" algn="ctr">
+                    <a:lnR cmpd="sng" algn="ctr" cap="flat" w="9525">
                       <a:solidFill>
                         <a:srgbClr val="000000"/>
                       </a:solidFill>
@@ -6024,7 +5857,7 @@
                       <a:headEnd type="none" w="med" len="med"/>
                       <a:tailEnd type="none" w="med" len="med"/>
                     </a:lnR>
-                    <a:lnT w="9525" cap="flat" cmpd="sng" algn="ctr">
+                    <a:lnT cmpd="sng" algn="ctr" cap="flat" w="9525">
                       <a:solidFill>
                         <a:srgbClr val="000000"/>
                       </a:solidFill>
@@ -6033,7 +5866,7 @@
                       <a:headEnd type="none" w="med" len="med"/>
                       <a:tailEnd type="none" w="med" len="med"/>
                     </a:lnT>
-                    <a:lnB w="9525" cap="flat" cmpd="sng" algn="ctr">
+                    <a:lnB cmpd="sng" algn="ctr" cap="flat" w="9525">
                       <a:solidFill>
                         <a:srgbClr val="000000"/>
                       </a:solidFill>
@@ -6049,7 +5882,7 @@
                 </a:tc>
                 <a:tc>
                   <a:txBody>
-                    <a:bodyPr/>
+                    <a:bodyPr anchor="t" rtlCol="false"/>
                     <a:lstStyle/>
                     <a:p>
                       <a:pPr algn="ctr">
@@ -6071,7 +5904,7 @@
                     </a:p>
                   </a:txBody>
                   <a:tcPr marL="190500" marR="190500" marT="190500" marB="190500" anchor="ctr">
-                    <a:lnL w="9525" cap="flat" cmpd="sng" algn="ctr">
+                    <a:lnL cmpd="sng" algn="ctr" cap="flat" w="9525">
                       <a:solidFill>
                         <a:srgbClr val="000000"/>
                       </a:solidFill>
@@ -6080,7 +5913,7 @@
                       <a:headEnd type="none" w="med" len="med"/>
                       <a:tailEnd type="none" w="med" len="med"/>
                     </a:lnL>
-                    <a:lnR w="9525" cap="flat" cmpd="sng" algn="ctr">
+                    <a:lnR cmpd="sng" algn="ctr" cap="flat" w="9525">
                       <a:solidFill>
                         <a:srgbClr val="000000"/>
                       </a:solidFill>
@@ -6089,7 +5922,7 @@
                       <a:headEnd type="none" w="med" len="med"/>
                       <a:tailEnd type="none" w="med" len="med"/>
                     </a:lnR>
-                    <a:lnT w="9525" cap="flat" cmpd="sng" algn="ctr">
+                    <a:lnT cmpd="sng" algn="ctr" cap="flat" w="9525">
                       <a:solidFill>
                         <a:srgbClr val="000000"/>
                       </a:solidFill>
@@ -6098,7 +5931,7 @@
                       <a:headEnd type="none" w="med" len="med"/>
                       <a:tailEnd type="none" w="med" len="med"/>
                     </a:lnT>
-                    <a:lnB w="9525" cap="flat" cmpd="sng" algn="ctr">
+                    <a:lnB cmpd="sng" algn="ctr" cap="flat" w="9525">
                       <a:solidFill>
                         <a:srgbClr val="000000"/>
                       </a:solidFill>
@@ -6112,11 +5945,6 @@
                     </a:solidFill>
                   </a:tcPr>
                 </a:tc>
-                <a:extLst>
-                  <a:ext uri="{0D108BD9-81ED-4DB2-BD59-A6C34878D82A}">
-                    <a16:rowId xmlns:a16="http://schemas.microsoft.com/office/drawing/2014/main" val="10001"/>
-                  </a:ext>
-                </a:extLst>
               </a:tr>
             </a:tbl>
           </a:graphicData>
@@ -6124,12 +5952,12 @@
       </p:graphicFrame>
       <p:sp>
         <p:nvSpPr>
-          <p:cNvPr id="4" name="TextBox 4"/>
-          <p:cNvSpPr txBox="1"/>
+          <p:cNvPr name="TextBox 4" id="4"/>
+          <p:cNvSpPr txBox="true"/>
           <p:nvPr/>
         </p:nvSpPr>
         <p:spPr>
-          <a:xfrm>
+          <a:xfrm rot="0">
             <a:off x="1028700" y="2510086"/>
             <a:ext cx="5103800" cy="4219178"/>
           </a:xfrm>
@@ -6138,7 +5966,7 @@
           </a:prstGeom>
         </p:spPr>
         <p:txBody>
-          <a:bodyPr lIns="0" tIns="0" rIns="0" bIns="0" rtlCol="0" anchor="t">
+          <a:bodyPr anchor="t" rtlCol="false" tIns="0" lIns="0" bIns="0" rIns="0">
             <a:spAutoFit/>
           </a:bodyPr>
           <a:lstStyle/>
@@ -6159,7 +5987,7 @@
             </a:r>
           </a:p>
           <a:p>
-            <a:pPr marL="0" lvl="0" indent="0">
+            <a:pPr marL="0" indent="0" lvl="0">
               <a:lnSpc>
                 <a:spcPts val="8399"/>
               </a:lnSpc>
@@ -6178,9 +6006,9 @@
       </p:sp>
       <p:graphicFrame>
         <p:nvGraphicFramePr>
-          <p:cNvPr id="5" name="Table 5"/>
+          <p:cNvPr name="Table 5" id="5"/>
           <p:cNvGraphicFramePr>
-            <a:graphicFrameLocks noGrp="1"/>
+            <a:graphicFrameLocks noGrp="true"/>
           </p:cNvGraphicFramePr>
           <p:nvPr/>
         </p:nvGraphicFramePr>
@@ -6193,18 +6021,12 @@
             <a:tbl>
               <a:tblPr/>
               <a:tblGrid>
-                <a:gridCol w="9551966">
-                  <a:extLst>
-                    <a:ext uri="{9D8B030D-6E8A-4147-A177-3AD203B41FA5}">
-                      <a16:colId xmlns:a16="http://schemas.microsoft.com/office/drawing/2014/main" val="20000"/>
-                    </a:ext>
-                  </a:extLst>
-                </a:gridCol>
+                <a:gridCol w="9551966"/>
               </a:tblGrid>
               <a:tr h="2824361">
                 <a:tc>
                   <a:txBody>
-                    <a:bodyPr/>
+                    <a:bodyPr anchor="t" rtlCol="false"/>
                     <a:lstStyle/>
                     <a:p>
                       <a:pPr algn="ctr">
@@ -6226,7 +6048,7 @@
                     </a:p>
                   </a:txBody>
                   <a:tcPr marL="190500" marR="190500" marT="190500" marB="190500" anchor="ctr">
-                    <a:lnL w="9525" cap="flat" cmpd="sng" algn="ctr">
+                    <a:lnL cmpd="sng" algn="ctr" cap="flat" w="9525">
                       <a:solidFill>
                         <a:srgbClr val="000000"/>
                       </a:solidFill>
@@ -6235,7 +6057,7 @@
                       <a:headEnd type="none" w="med" len="med"/>
                       <a:tailEnd type="none" w="med" len="med"/>
                     </a:lnL>
-                    <a:lnR w="9525" cap="flat" cmpd="sng" algn="ctr">
+                    <a:lnR cmpd="sng" algn="ctr" cap="flat" w="9525">
                       <a:solidFill>
                         <a:srgbClr val="000000"/>
                       </a:solidFill>
@@ -6244,7 +6066,7 @@
                       <a:headEnd type="none" w="med" len="med"/>
                       <a:tailEnd type="none" w="med" len="med"/>
                     </a:lnR>
-                    <a:lnT w="9525" cap="flat" cmpd="sng" algn="ctr">
+                    <a:lnT cmpd="sng" algn="ctr" cap="flat" w="9525">
                       <a:solidFill>
                         <a:srgbClr val="000000"/>
                       </a:solidFill>
@@ -6253,7 +6075,7 @@
                       <a:headEnd type="none" w="med" len="med"/>
                       <a:tailEnd type="none" w="med" len="med"/>
                     </a:lnT>
-                    <a:lnB w="9525" cap="flat" cmpd="sng" algn="ctr">
+                    <a:lnB cmpd="sng" algn="ctr" cap="flat" w="9525">
                       <a:solidFill>
                         <a:srgbClr val="000000"/>
                       </a:solidFill>
@@ -6267,11 +6089,6 @@
                     </a:solidFill>
                   </a:tcPr>
                 </a:tc>
-                <a:extLst>
-                  <a:ext uri="{0D108BD9-81ED-4DB2-BD59-A6C34878D82A}">
-                    <a16:rowId xmlns:a16="http://schemas.microsoft.com/office/drawing/2014/main" val="10000"/>
-                  </a:ext>
-                </a:extLst>
               </a:tr>
             </a:tbl>
           </a:graphicData>
@@ -6286,7 +6103,7 @@
 </file>
 
 <file path=ppt/slides/slide7.xml><?xml version="1.0" encoding="utf-8"?>
-<p:sld xmlns:a="http://schemas.openxmlformats.org/drawingml/2006/main" xmlns:r="http://schemas.openxmlformats.org/officeDocument/2006/relationships" xmlns:p="http://schemas.openxmlformats.org/presentationml/2006/main">
+<p:sld xmlns:p="http://schemas.openxmlformats.org/presentationml/2006/main" xmlns:a="http://schemas.openxmlformats.org/drawingml/2006/main" xmlns:r="http://schemas.openxmlformats.org/officeDocument/2006/relationships">
   <p:cSld>
     <p:spTree>
       <p:nvGrpSpPr>
@@ -6304,12 +6121,12 @@
       </p:grpSpPr>
       <p:sp>
         <p:nvSpPr>
-          <p:cNvPr id="2" name="Freeform 2"/>
+          <p:cNvPr name="Freeform 2" id="2"/>
           <p:cNvSpPr/>
           <p:nvPr/>
         </p:nvSpPr>
         <p:spPr>
-          <a:xfrm>
+          <a:xfrm flipH="false" flipV="false" rot="0">
             <a:off x="-1748701" y="5421854"/>
             <a:ext cx="10471590" cy="5235795"/>
           </a:xfrm>
@@ -6318,9 +6135,9 @@
             <a:gdLst/>
             <a:ahLst/>
             <a:cxnLst/>
-            <a:rect l="l" t="t" r="r" b="b"/>
+            <a:rect r="r" b="b" t="t" l="l"/>
             <a:pathLst>
-              <a:path w="10471590" h="5235795">
+              <a:path h="5235795" w="10471590">
                 <a:moveTo>
                   <a:pt x="0" y="0"/>
                 </a:moveTo>
@@ -6349,19 +6166,19 @@
               </a:extLst>
             </a:blip>
             <a:stretch>
-              <a:fillRect/>
+              <a:fillRect l="0" t="0" r="0" b="0"/>
             </a:stretch>
           </a:blipFill>
         </p:spPr>
       </p:sp>
       <p:grpSp>
         <p:nvGrpSpPr>
-          <p:cNvPr id="3" name="Group 3"/>
+          <p:cNvPr name="Group 3" id="3"/>
           <p:cNvGrpSpPr/>
           <p:nvPr/>
         </p:nvGrpSpPr>
         <p:grpSpPr>
-          <a:xfrm>
+          <a:xfrm rot="0">
             <a:off x="11083024" y="-4748625"/>
             <a:ext cx="10170480" cy="10170480"/>
             <a:chOff x="0" y="0"/>
@@ -6370,12 +6187,12 @@
         </p:grpSpPr>
         <p:sp>
           <p:nvSpPr>
-            <p:cNvPr id="4" name="Freeform 4"/>
+            <p:cNvPr name="Freeform 4" id="4"/>
             <p:cNvSpPr/>
             <p:nvPr/>
           </p:nvSpPr>
           <p:spPr>
-            <a:xfrm>
+            <a:xfrm flipH="false" flipV="false" rot="0">
               <a:off x="0" y="0"/>
               <a:ext cx="6350000" cy="6350000"/>
             </a:xfrm>
@@ -6384,9 +6201,9 @@
               <a:gdLst/>
               <a:ahLst/>
               <a:cxnLst/>
-              <a:rect l="l" t="t" r="r" b="b"/>
+              <a:rect r="r" b="b" t="t" l="l"/>
               <a:pathLst>
-                <a:path w="6350000" h="6350000">
+                <a:path h="6350000" w="6350000">
                   <a:moveTo>
                     <a:pt x="3175000" y="0"/>
                   </a:moveTo>
@@ -6422,62 +6239,50 @@
       </p:grpSp>
       <p:graphicFrame>
         <p:nvGraphicFramePr>
-          <p:cNvPr id="5" name="Table 5"/>
+          <p:cNvPr name="Table 5" id="5"/>
           <p:cNvGraphicFramePr>
-            <a:graphicFrameLocks noGrp="1"/>
+            <a:graphicFrameLocks noGrp="true"/>
           </p:cNvGraphicFramePr>
           <p:nvPr/>
         </p:nvGraphicFramePr>
         <p:xfrm>
-          <a:off x="3808979" y="2451819"/>
-          <a:ext cx="10265312" cy="6631282"/>
+          <a:off x="4710759" y="2273041"/>
+          <a:ext cx="7658267" cy="4256225"/>
         </p:xfrm>
         <a:graphic>
           <a:graphicData uri="http://schemas.openxmlformats.org/drawingml/2006/table">
             <a:tbl>
               <a:tblPr/>
               <a:tblGrid>
-                <a:gridCol w="5320908">
-                  <a:extLst>
-                    <a:ext uri="{9D8B030D-6E8A-4147-A177-3AD203B41FA5}">
-                      <a16:colId xmlns:a16="http://schemas.microsoft.com/office/drawing/2014/main" val="20000"/>
-                    </a:ext>
-                  </a:extLst>
-                </a:gridCol>
-                <a:gridCol w="4944404">
-                  <a:extLst>
-                    <a:ext uri="{9D8B030D-6E8A-4147-A177-3AD203B41FA5}">
-                      <a16:colId xmlns:a16="http://schemas.microsoft.com/office/drawing/2014/main" val="20001"/>
-                    </a:ext>
-                  </a:extLst>
-                </a:gridCol>
+                <a:gridCol w="3969576"/>
+                <a:gridCol w="3688691"/>
               </a:tblGrid>
-              <a:tr h="1896633">
+              <a:tr h="1415283">
                 <a:tc>
                   <a:txBody>
-                    <a:bodyPr/>
+                    <a:bodyPr anchor="t" rtlCol="false"/>
                     <a:lstStyle/>
                     <a:p>
                       <a:pPr algn="ctr">
                         <a:lnSpc>
-                          <a:spcPts val="3919"/>
+                          <a:spcPts val="3385"/>
                         </a:lnSpc>
                         <a:defRPr/>
                       </a:pPr>
                       <a:r>
-                        <a:rPr lang="en-US" sz="2799">
+                        <a:rPr lang="en-US" sz="2418">
                           <a:solidFill>
                             <a:srgbClr val="FFFFFF"/>
                           </a:solidFill>
                           <a:latin typeface="Open Sauce Bold"/>
                         </a:rPr>
-                        <a:t>CURVA DE APRENDIZAGEM</a:t>
+                        <a:t>COMPLEXIDADE</a:t>
                       </a:r>
                       <a:endParaRPr lang="en-US" sz="1100"/>
                     </a:p>
                   </a:txBody>
-                  <a:tcPr marL="190500" marR="190500" marT="190500" marB="190500" anchor="ctr">
-                    <a:lnL w="9525" cap="flat" cmpd="sng" algn="ctr">
+                  <a:tcPr marL="164541" marR="164541" marT="164541" marB="164541" anchor="ctr">
+                    <a:lnL cmpd="sng" algn="ctr" cap="flat" w="7106">
                       <a:solidFill>
                         <a:srgbClr val="000000"/>
                       </a:solidFill>
@@ -6486,7 +6291,7 @@
                       <a:headEnd type="none" w="med" len="med"/>
                       <a:tailEnd type="none" w="med" len="med"/>
                     </a:lnL>
-                    <a:lnR w="9525" cap="flat" cmpd="sng" algn="ctr">
+                    <a:lnR cmpd="sng" algn="ctr" cap="flat" w="7106">
                       <a:solidFill>
                         <a:srgbClr val="000000"/>
                       </a:solidFill>
@@ -6495,7 +6300,7 @@
                       <a:headEnd type="none" w="med" len="med"/>
                       <a:tailEnd type="none" w="med" len="med"/>
                     </a:lnR>
-                    <a:lnT w="9525" cap="flat" cmpd="sng" algn="ctr">
+                    <a:lnT cmpd="sng" algn="ctr" cap="flat" w="7106">
                       <a:solidFill>
                         <a:srgbClr val="000000"/>
                       </a:solidFill>
@@ -6504,7 +6309,7 @@
                       <a:headEnd type="none" w="med" len="med"/>
                       <a:tailEnd type="none" w="med" len="med"/>
                     </a:lnT>
-                    <a:lnB w="9525" cap="flat" cmpd="sng" algn="ctr">
+                    <a:lnB cmpd="sng" algn="ctr" cap="flat" w="7106">
                       <a:solidFill>
                         <a:srgbClr val="000000"/>
                       </a:solidFill>
@@ -6520,29 +6325,29 @@
                 </a:tc>
                 <a:tc>
                   <a:txBody>
-                    <a:bodyPr/>
+                    <a:bodyPr anchor="t" rtlCol="false"/>
                     <a:lstStyle/>
                     <a:p>
                       <a:pPr algn="ctr">
                         <a:lnSpc>
-                          <a:spcPts val="3919"/>
+                          <a:spcPts val="3385"/>
                         </a:lnSpc>
                         <a:defRPr/>
                       </a:pPr>
                       <a:r>
-                        <a:rPr lang="en-US" sz="2799">
+                        <a:rPr lang="en-US" sz="2418">
                           <a:solidFill>
                             <a:srgbClr val="FFFFFF"/>
                           </a:solidFill>
                           <a:latin typeface="Open Sauce Bold"/>
                         </a:rPr>
-                        <a:t>DOCUMENTAÇÃO</a:t>
+                        <a:t>CURVA DE APRENDIZAGEM</a:t>
                       </a:r>
                       <a:endParaRPr lang="en-US" sz="1100"/>
                     </a:p>
                   </a:txBody>
-                  <a:tcPr marL="190500" marR="190500" marT="190500" marB="190500" anchor="ctr">
-                    <a:lnL w="9525" cap="flat" cmpd="sng" algn="ctr">
+                  <a:tcPr marL="164541" marR="164541" marT="164541" marB="164541" anchor="ctr">
+                    <a:lnL cmpd="sng" algn="ctr" cap="flat" w="7106">
                       <a:solidFill>
                         <a:srgbClr val="000000"/>
                       </a:solidFill>
@@ -6551,7 +6356,7 @@
                       <a:headEnd type="none" w="med" len="med"/>
                       <a:tailEnd type="none" w="med" len="med"/>
                     </a:lnL>
-                    <a:lnR w="9525" cap="flat" cmpd="sng" algn="ctr">
+                    <a:lnR cmpd="sng" algn="ctr" cap="flat" w="7106">
                       <a:solidFill>
                         <a:srgbClr val="000000"/>
                       </a:solidFill>
@@ -6560,7 +6365,7 @@
                       <a:headEnd type="none" w="med" len="med"/>
                       <a:tailEnd type="none" w="med" len="med"/>
                     </a:lnR>
-                    <a:lnT w="9525" cap="flat" cmpd="sng" algn="ctr">
+                    <a:lnT cmpd="sng" algn="ctr" cap="flat" w="7106">
                       <a:solidFill>
                         <a:srgbClr val="000000"/>
                       </a:solidFill>
@@ -6569,7 +6374,7 @@
                       <a:headEnd type="none" w="med" len="med"/>
                       <a:tailEnd type="none" w="med" len="med"/>
                     </a:lnT>
-                    <a:lnB w="9525" cap="flat" cmpd="sng" algn="ctr">
+                    <a:lnB cmpd="sng" algn="ctr" cap="flat" w="7106">
                       <a:solidFill>
                         <a:srgbClr val="000000"/>
                       </a:solidFill>
@@ -6583,40 +6388,33 @@
                     </a:solidFill>
                   </a:tcPr>
                 </a:tc>
-                <a:extLst>
-                  <a:ext uri="{0D108BD9-81ED-4DB2-BD59-A6C34878D82A}">
-                    <a16:rowId xmlns:a16="http://schemas.microsoft.com/office/drawing/2014/main" val="10000"/>
-                  </a:ext>
-                </a:extLst>
               </a:tr>
-              <a:tr h="4734649">
+              <a:tr h="1425660">
                 <a:tc>
                   <a:txBody>
-                    <a:bodyPr/>
+                    <a:bodyPr anchor="t" rtlCol="false"/>
                     <a:lstStyle/>
                     <a:p>
-                      <a:pPr marL="431801" lvl="1" indent="-215900" algn="l">
+                      <a:pPr algn="ctr">
                         <a:lnSpc>
-                          <a:spcPts val="2800"/>
+                          <a:spcPts val="3385"/>
                         </a:lnSpc>
-                        <a:buFont typeface="Arial"/>
-                        <a:buChar char="•"/>
                         <a:defRPr/>
                       </a:pPr>
                       <a:r>
-                        <a:rPr lang="en-US" sz="2000">
+                        <a:rPr lang="en-US" sz="2418">
                           <a:solidFill>
-                            <a:srgbClr val="000000"/>
+                            <a:srgbClr val="FFFFFF"/>
                           </a:solidFill>
-                          <a:latin typeface="Open Sauce"/>
+                          <a:latin typeface="Open Sauce Bold"/>
                         </a:rPr>
-                        <a:t>Pode ser complexa para iniciantes, sendo importante investir tempo na compreensão dos conceitos e padrões.</a:t>
+                        <a:t>GERENCIAMENTO DE ESTADO</a:t>
                       </a:r>
                       <a:endParaRPr lang="en-US" sz="1100"/>
                     </a:p>
                   </a:txBody>
-                  <a:tcPr marL="190500" marR="190500" marT="190500" marB="190500" anchor="ctr">
-                    <a:lnL w="9525" cap="flat" cmpd="sng" algn="ctr">
+                  <a:tcPr marL="164541" marR="164541" marT="164541" marB="164541" anchor="ctr">
+                    <a:lnL cmpd="sng" algn="ctr" cap="flat" w="7106">
                       <a:solidFill>
                         <a:srgbClr val="000000"/>
                       </a:solidFill>
@@ -6625,7 +6423,7 @@
                       <a:headEnd type="none" w="med" len="med"/>
                       <a:tailEnd type="none" w="med" len="med"/>
                     </a:lnL>
-                    <a:lnR w="9525" cap="flat" cmpd="sng" algn="ctr">
+                    <a:lnR cmpd="sng" algn="ctr" cap="flat" w="7106">
                       <a:solidFill>
                         <a:srgbClr val="000000"/>
                       </a:solidFill>
@@ -6634,7 +6432,7 @@
                       <a:headEnd type="none" w="med" len="med"/>
                       <a:tailEnd type="none" w="med" len="med"/>
                     </a:lnR>
-                    <a:lnT w="9525" cap="flat" cmpd="sng" algn="ctr">
+                    <a:lnT cmpd="sng" algn="ctr" cap="flat" w="7106">
                       <a:solidFill>
                         <a:srgbClr val="000000"/>
                       </a:solidFill>
@@ -6643,7 +6441,7 @@
                       <a:headEnd type="none" w="med" len="med"/>
                       <a:tailEnd type="none" w="med" len="med"/>
                     </a:lnT>
-                    <a:lnB w="9525" cap="flat" cmpd="sng" algn="ctr">
+                    <a:lnB cmpd="sng" algn="ctr" cap="flat" w="7106">
                       <a:solidFill>
                         <a:srgbClr val="000000"/>
                       </a:solidFill>
@@ -6653,37 +6451,35 @@
                       <a:tailEnd type="none" w="med" len="med"/>
                     </a:lnB>
                     <a:solidFill>
-                      <a:srgbClr val="F1EEEE"/>
+                      <a:srgbClr val="197B98"/>
                     </a:solidFill>
                   </a:tcPr>
                 </a:tc>
                 <a:tc>
                   <a:txBody>
-                    <a:bodyPr/>
+                    <a:bodyPr anchor="t" rtlCol="false"/>
                     <a:lstStyle/>
                     <a:p>
-                      <a:pPr marL="431801" lvl="1" indent="-215900" algn="l">
+                      <a:pPr algn="ctr">
                         <a:lnSpc>
-                          <a:spcPts val="2800"/>
+                          <a:spcPts val="3385"/>
                         </a:lnSpc>
-                        <a:buFont typeface="Arial"/>
-                        <a:buChar char="•"/>
                         <a:defRPr/>
                       </a:pPr>
                       <a:r>
-                        <a:rPr lang="en-US" sz="2000">
+                        <a:rPr lang="en-US" sz="2418">
                           <a:solidFill>
-                            <a:srgbClr val="000000"/>
+                            <a:srgbClr val="FFFFFF"/>
                           </a:solidFill>
-                          <a:latin typeface="Open Sauce"/>
+                          <a:latin typeface="Open Sauce Bold"/>
                         </a:rPr>
-                        <a:t> Embora existam recursos disponíveis, a documentação completa ainda é um desafio.</a:t>
+                        <a:t>FALTA DE DOCUMENTAÇÃO E COMUNIDADE</a:t>
                       </a:r>
                       <a:endParaRPr lang="en-US" sz="1100"/>
                     </a:p>
                   </a:txBody>
-                  <a:tcPr marL="190500" marR="190500" marT="190500" marB="190500" anchor="ctr">
-                    <a:lnL w="9525" cap="flat" cmpd="sng" algn="ctr">
+                  <a:tcPr marL="164541" marR="164541" marT="164541" marB="164541" anchor="ctr">
+                    <a:lnL cmpd="sng" algn="ctr" cap="flat" w="7106">
                       <a:solidFill>
                         <a:srgbClr val="000000"/>
                       </a:solidFill>
@@ -6692,7 +6488,7 @@
                       <a:headEnd type="none" w="med" len="med"/>
                       <a:tailEnd type="none" w="med" len="med"/>
                     </a:lnL>
-                    <a:lnR w="9525" cap="flat" cmpd="sng" algn="ctr">
+                    <a:lnR cmpd="sng" algn="ctr" cap="flat" w="7106">
                       <a:solidFill>
                         <a:srgbClr val="000000"/>
                       </a:solidFill>
@@ -6701,7 +6497,7 @@
                       <a:headEnd type="none" w="med" len="med"/>
                       <a:tailEnd type="none" w="med" len="med"/>
                     </a:lnR>
-                    <a:lnT w="9525" cap="flat" cmpd="sng" algn="ctr">
+                    <a:lnT cmpd="sng" algn="ctr" cap="flat" w="7106">
                       <a:solidFill>
                         <a:srgbClr val="000000"/>
                       </a:solidFill>
@@ -6710,7 +6506,7 @@
                       <a:headEnd type="none" w="med" len="med"/>
                       <a:tailEnd type="none" w="med" len="med"/>
                     </a:lnT>
-                    <a:lnB w="9525" cap="flat" cmpd="sng" algn="ctr">
+                    <a:lnB cmpd="sng" algn="ctr" cap="flat" w="7106">
                       <a:solidFill>
                         <a:srgbClr val="000000"/>
                       </a:solidFill>
@@ -6720,15 +6516,142 @@
                       <a:tailEnd type="none" w="med" len="med"/>
                     </a:lnB>
                     <a:solidFill>
-                      <a:srgbClr val="F1EEEE"/>
+                      <a:srgbClr val="197B98"/>
                     </a:solidFill>
                   </a:tcPr>
                 </a:tc>
-                <a:extLst>
-                  <a:ext uri="{0D108BD9-81ED-4DB2-BD59-A6C34878D82A}">
-                    <a16:rowId xmlns:a16="http://schemas.microsoft.com/office/drawing/2014/main" val="10001"/>
-                  </a:ext>
-                </a:extLst>
+              </a:tr>
+              <a:tr h="1415283">
+                <a:tc>
+                  <a:txBody>
+                    <a:bodyPr anchor="t" rtlCol="false"/>
+                    <a:lstStyle/>
+                    <a:p>
+                      <a:pPr algn="ctr">
+                        <a:lnSpc>
+                          <a:spcPts val="3385"/>
+                        </a:lnSpc>
+                        <a:defRPr/>
+                      </a:pPr>
+                      <a:r>
+                        <a:rPr lang="en-US" sz="2418">
+                          <a:solidFill>
+                            <a:srgbClr val="FFFFFF"/>
+                          </a:solidFill>
+                          <a:latin typeface="Open Sauce Bold"/>
+                        </a:rPr>
+                        <a:t>CÓDIGO BOILERPLATE</a:t>
+                      </a:r>
+                      <a:endParaRPr lang="en-US" sz="1100"/>
+                    </a:p>
+                  </a:txBody>
+                  <a:tcPr marL="164541" marR="164541" marT="164541" marB="164541" anchor="ctr">
+                    <a:lnL cmpd="sng" algn="ctr" cap="flat" w="7106">
+                      <a:solidFill>
+                        <a:srgbClr val="000000"/>
+                      </a:solidFill>
+                      <a:prstDash val="solid"/>
+                      <a:round/>
+                      <a:headEnd type="none" w="med" len="med"/>
+                      <a:tailEnd type="none" w="med" len="med"/>
+                    </a:lnL>
+                    <a:lnR cmpd="sng" algn="ctr" cap="flat" w="7106">
+                      <a:solidFill>
+                        <a:srgbClr val="000000"/>
+                      </a:solidFill>
+                      <a:prstDash val="solid"/>
+                      <a:round/>
+                      <a:headEnd type="none" w="med" len="med"/>
+                      <a:tailEnd type="none" w="med" len="med"/>
+                    </a:lnR>
+                    <a:lnT cmpd="sng" algn="ctr" cap="flat" w="7106">
+                      <a:solidFill>
+                        <a:srgbClr val="000000"/>
+                      </a:solidFill>
+                      <a:prstDash val="solid"/>
+                      <a:round/>
+                      <a:headEnd type="none" w="med" len="med"/>
+                      <a:tailEnd type="none" w="med" len="med"/>
+                    </a:lnT>
+                    <a:lnB cmpd="sng" algn="ctr" cap="flat" w="7106">
+                      <a:solidFill>
+                        <a:srgbClr val="000000"/>
+                      </a:solidFill>
+                      <a:prstDash val="solid"/>
+                      <a:round/>
+                      <a:headEnd type="none" w="med" len="med"/>
+                      <a:tailEnd type="none" w="med" len="med"/>
+                    </a:lnB>
+                    <a:solidFill>
+                      <a:srgbClr val="197B98"/>
+                    </a:solidFill>
+                  </a:tcPr>
+                </a:tc>
+                <a:tc>
+                  <a:txBody>
+                    <a:bodyPr anchor="t" rtlCol="false"/>
+                    <a:lstStyle/>
+                    <a:p>
+                      <a:pPr algn="ctr">
+                        <a:lnSpc>
+                          <a:spcPts val="3385"/>
+                        </a:lnSpc>
+                        <a:defRPr/>
+                      </a:pPr>
+                      <a:r>
+                        <a:rPr lang="en-US" sz="2418">
+                          <a:solidFill>
+                            <a:srgbClr val="FFFFFF"/>
+                          </a:solidFill>
+                          <a:latin typeface="Open Sauce Bold"/>
+                        </a:rPr>
+                        <a:t>DESEMPENHO E OVER-ENGINEERING</a:t>
+                      </a:r>
+                      <a:endParaRPr lang="en-US" sz="1100"/>
+                    </a:p>
+                  </a:txBody>
+                  <a:tcPr marL="164541" marR="164541" marT="164541" marB="164541" anchor="ctr">
+                    <a:lnL cmpd="sng" algn="ctr" cap="flat" w="7106">
+                      <a:solidFill>
+                        <a:srgbClr val="000000"/>
+                      </a:solidFill>
+                      <a:prstDash val="solid"/>
+                      <a:round/>
+                      <a:headEnd type="none" w="med" len="med"/>
+                      <a:tailEnd type="none" w="med" len="med"/>
+                    </a:lnL>
+                    <a:lnR cmpd="sng" algn="ctr" cap="flat" w="7106">
+                      <a:solidFill>
+                        <a:srgbClr val="000000"/>
+                      </a:solidFill>
+                      <a:prstDash val="solid"/>
+                      <a:round/>
+                      <a:headEnd type="none" w="med" len="med"/>
+                      <a:tailEnd type="none" w="med" len="med"/>
+                    </a:lnR>
+                    <a:lnT cmpd="sng" algn="ctr" cap="flat" w="7106">
+                      <a:solidFill>
+                        <a:srgbClr val="000000"/>
+                      </a:solidFill>
+                      <a:prstDash val="solid"/>
+                      <a:round/>
+                      <a:headEnd type="none" w="med" len="med"/>
+                      <a:tailEnd type="none" w="med" len="med"/>
+                    </a:lnT>
+                    <a:lnB cmpd="sng" algn="ctr" cap="flat" w="7106">
+                      <a:solidFill>
+                        <a:srgbClr val="000000"/>
+                      </a:solidFill>
+                      <a:prstDash val="solid"/>
+                      <a:round/>
+                      <a:headEnd type="none" w="med" len="med"/>
+                      <a:tailEnd type="none" w="med" len="med"/>
+                    </a:lnB>
+                    <a:solidFill>
+                      <a:srgbClr val="197B98"/>
+                    </a:solidFill>
+                  </a:tcPr>
+                </a:tc>
               </a:tr>
             </a:tbl>
           </a:graphicData>
@@ -6736,12 +6659,12 @@
       </p:graphicFrame>
       <p:sp>
         <p:nvSpPr>
-          <p:cNvPr id="6" name="TextBox 6"/>
-          <p:cNvSpPr txBox="1"/>
+          <p:cNvPr name="TextBox 6" id="6"/>
+          <p:cNvSpPr txBox="true"/>
           <p:nvPr/>
         </p:nvSpPr>
         <p:spPr>
-          <a:xfrm>
+          <a:xfrm rot="0">
             <a:off x="1028700" y="305314"/>
             <a:ext cx="9442522" cy="1838127"/>
           </a:xfrm>
@@ -6750,12 +6673,12 @@
           </a:prstGeom>
         </p:spPr>
         <p:txBody>
-          <a:bodyPr lIns="0" tIns="0" rIns="0" bIns="0" rtlCol="0" anchor="t">
+          <a:bodyPr anchor="t" rtlCol="false" tIns="0" lIns="0" bIns="0" rIns="0">
             <a:spAutoFit/>
           </a:bodyPr>
           <a:lstStyle/>
           <a:p>
-            <a:pPr marL="0" lvl="0" indent="0" algn="ctr">
+            <a:pPr algn="ctr" marL="0" indent="0" lvl="0">
               <a:lnSpc>
                 <a:spcPts val="7200"/>
               </a:lnSpc>

</xml_diff>